<commit_message>
Added Link of Prototype in  PPT
</commit_message>
<xml_diff>
--- a/I-nnovate_Hackathon Spam Byte Submission.pptx
+++ b/I-nnovate_Hackathon Spam Byte Submission.pptx
@@ -5,25 +5,26 @@
     <p:sldMasterId id="2147483648" r:id="rId4"/>
   </p:sldMasterIdLst>
   <p:notesMasterIdLst>
-    <p:notesMasterId r:id="rId18"/>
+    <p:notesMasterId r:id="rId19"/>
   </p:notesMasterIdLst>
   <p:handoutMasterIdLst>
-    <p:handoutMasterId r:id="rId19"/>
+    <p:handoutMasterId r:id="rId20"/>
   </p:handoutMasterIdLst>
   <p:sldIdLst>
     <p:sldId id="256" r:id="rId5"/>
-    <p:sldId id="404" r:id="rId6"/>
-    <p:sldId id="395" r:id="rId7"/>
-    <p:sldId id="396" r:id="rId8"/>
-    <p:sldId id="397" r:id="rId9"/>
-    <p:sldId id="399" r:id="rId10"/>
-    <p:sldId id="405" r:id="rId11"/>
-    <p:sldId id="398" r:id="rId12"/>
-    <p:sldId id="401" r:id="rId13"/>
-    <p:sldId id="406" r:id="rId14"/>
-    <p:sldId id="407" r:id="rId15"/>
-    <p:sldId id="400" r:id="rId16"/>
-    <p:sldId id="273" r:id="rId17"/>
+    <p:sldId id="403" r:id="rId6"/>
+    <p:sldId id="404" r:id="rId7"/>
+    <p:sldId id="395" r:id="rId8"/>
+    <p:sldId id="396" r:id="rId9"/>
+    <p:sldId id="397" r:id="rId10"/>
+    <p:sldId id="399" r:id="rId11"/>
+    <p:sldId id="405" r:id="rId12"/>
+    <p:sldId id="398" r:id="rId13"/>
+    <p:sldId id="401" r:id="rId14"/>
+    <p:sldId id="406" r:id="rId15"/>
+    <p:sldId id="407" r:id="rId16"/>
+    <p:sldId id="400" r:id="rId17"/>
+    <p:sldId id="273" r:id="rId18"/>
   </p:sldIdLst>
   <p:sldSz cx="12192000" cy="6858000"/>
   <p:notesSz cx="6858000" cy="9144000"/>
@@ -235,7 +236,7 @@
           <a:p>
             <a:fld id="{9A69CF9B-9788-489B-AA5F-D369B980CDA3}" type="datetimeFigureOut">
               <a:rPr lang="en-IN" smtClean="0"/>
-              <a:t>04-12-2023</a:t>
+              <a:t>05-12-2023</a:t>
             </a:fld>
             <a:endParaRPr lang="en-IN"/>
           </a:p>
@@ -400,7 +401,7 @@
           <a:p>
             <a:fld id="{FFCDD790-8BB2-467C-818E-2F302AAFF003}" type="datetimeFigureOut">
               <a:rPr lang="en-IN" smtClean="0"/>
-              <a:t>04-12-2023</a:t>
+              <a:t>05-12-2023</a:t>
             </a:fld>
             <a:endParaRPr lang="en-IN"/>
           </a:p>
@@ -712,7 +713,7 @@
           <a:bodyPr/>
           <a:lstStyle/>
           <a:p>
-            <a:endParaRPr lang="en-IN" dirty="0"/>
+            <a:endParaRPr lang="en-IN"/>
           </a:p>
         </p:txBody>
       </p:sp>
@@ -733,7 +734,91 @@
           <a:p>
             <a:fld id="{64C8E18E-FED0-435B-9897-23204D9645F4}" type="slidenum">
               <a:rPr lang="en-IN" smtClean="0"/>
-              <a:t>12</a:t>
+              <a:t>2</a:t>
+            </a:fld>
+            <a:endParaRPr lang="en-IN"/>
+          </a:p>
+        </p:txBody>
+      </p:sp>
+    </p:spTree>
+    <p:extLst>
+      <p:ext uri="{BB962C8B-B14F-4D97-AF65-F5344CB8AC3E}">
+        <p14:creationId xmlns:p14="http://schemas.microsoft.com/office/powerpoint/2010/main" val="4128513053"/>
+      </p:ext>
+    </p:extLst>
+  </p:cSld>
+  <p:clrMapOvr>
+    <a:masterClrMapping/>
+  </p:clrMapOvr>
+</p:notes>
+</file>
+
+<file path=ppt/notesSlides/notesSlide2.xml><?xml version="1.0" encoding="utf-8"?>
+<p:notes xmlns:a="http://schemas.openxmlformats.org/drawingml/2006/main" xmlns:r="http://schemas.openxmlformats.org/officeDocument/2006/relationships" xmlns:p="http://schemas.openxmlformats.org/presentationml/2006/main">
+  <p:cSld>
+    <p:spTree>
+      <p:nvGrpSpPr>
+        <p:cNvPr id="1" name=""/>
+        <p:cNvGrpSpPr/>
+        <p:nvPr/>
+      </p:nvGrpSpPr>
+      <p:grpSpPr>
+        <a:xfrm>
+          <a:off x="0" y="0"/>
+          <a:ext cx="0" cy="0"/>
+          <a:chOff x="0" y="0"/>
+          <a:chExt cx="0" cy="0"/>
+        </a:xfrm>
+      </p:grpSpPr>
+      <p:sp>
+        <p:nvSpPr>
+          <p:cNvPr id="2" name="Slide Image Placeholder 1"/>
+          <p:cNvSpPr>
+            <a:spLocks noGrp="1" noRot="1" noChangeAspect="1"/>
+          </p:cNvSpPr>
+          <p:nvPr>
+            <p:ph type="sldImg"/>
+          </p:nvPr>
+        </p:nvSpPr>
+        <p:spPr/>
+      </p:sp>
+      <p:sp>
+        <p:nvSpPr>
+          <p:cNvPr id="3" name="Notes Placeholder 2"/>
+          <p:cNvSpPr>
+            <a:spLocks noGrp="1"/>
+          </p:cNvSpPr>
+          <p:nvPr>
+            <p:ph type="body" idx="1"/>
+          </p:nvPr>
+        </p:nvSpPr>
+        <p:spPr/>
+        <p:txBody>
+          <a:bodyPr/>
+          <a:lstStyle/>
+          <a:p>
+            <a:endParaRPr lang="en-IN" dirty="0"/>
+          </a:p>
+        </p:txBody>
+      </p:sp>
+      <p:sp>
+        <p:nvSpPr>
+          <p:cNvPr id="4" name="Slide Number Placeholder 3"/>
+          <p:cNvSpPr>
+            <a:spLocks noGrp="1"/>
+          </p:cNvSpPr>
+          <p:nvPr>
+            <p:ph type="sldNum" sz="quarter" idx="5"/>
+          </p:nvPr>
+        </p:nvSpPr>
+        <p:spPr/>
+        <p:txBody>
+          <a:bodyPr/>
+          <a:lstStyle/>
+          <a:p>
+            <a:fld id="{64C8E18E-FED0-435B-9897-23204D9645F4}" type="slidenum">
+              <a:rPr lang="en-IN" smtClean="0"/>
+              <a:t>13</a:t>
             </a:fld>
             <a:endParaRPr lang="en-IN"/>
           </a:p>
@@ -21896,6 +21981,225 @@
       </p:grpSpPr>
       <p:sp>
         <p:nvSpPr>
+          <p:cNvPr id="4" name="Title 3">
+            <a:extLst>
+              <a:ext uri="{FF2B5EF4-FFF2-40B4-BE49-F238E27FC236}">
+                <a16:creationId xmlns:a16="http://schemas.microsoft.com/office/drawing/2014/main" id="{B46056A9-800D-4D02-A379-968FFCF2FEB7}"/>
+              </a:ext>
+            </a:extLst>
+          </p:cNvPr>
+          <p:cNvSpPr>
+            <a:spLocks noGrp="1"/>
+          </p:cNvSpPr>
+          <p:nvPr>
+            <p:ph type="title"/>
+          </p:nvPr>
+        </p:nvSpPr>
+        <p:spPr/>
+        <p:txBody>
+          <a:bodyPr/>
+          <a:lstStyle/>
+          <a:p>
+            <a:r>
+              <a:rPr lang="en-IN">
+                <a:solidFill>
+                  <a:schemeClr val="accent4">
+                    <a:lumMod val="75000"/>
+                    <a:lumOff val="25000"/>
+                  </a:schemeClr>
+                </a:solidFill>
+              </a:rPr>
+              <a:t>Financial Feasibility</a:t>
+            </a:r>
+          </a:p>
+        </p:txBody>
+      </p:sp>
+      <p:sp>
+        <p:nvSpPr>
+          <p:cNvPr id="2" name="TextBox 1">
+            <a:extLst>
+              <a:ext uri="{FF2B5EF4-FFF2-40B4-BE49-F238E27FC236}">
+                <a16:creationId xmlns:a16="http://schemas.microsoft.com/office/drawing/2014/main" id="{CFB429B5-1F1B-D511-B323-51FDACC5DAEA}"/>
+              </a:ext>
+            </a:extLst>
+          </p:cNvPr>
+          <p:cNvSpPr txBox="1"/>
+          <p:nvPr/>
+        </p:nvSpPr>
+        <p:spPr>
+          <a:xfrm>
+            <a:off x="421821" y="944136"/>
+            <a:ext cx="11348358" cy="5632311"/>
+          </a:xfrm>
+          <a:prstGeom prst="rect">
+            <a:avLst/>
+          </a:prstGeom>
+          <a:noFill/>
+        </p:spPr>
+        <p:txBody>
+          <a:bodyPr wrap="square" rtlCol="0">
+            <a:spAutoFit/>
+          </a:bodyPr>
+          <a:lstStyle/>
+          <a:p>
+            <a:r>
+              <a:rPr lang="en-GB" b="1">
+                <a:solidFill>
+                  <a:srgbClr val="7030A0"/>
+                </a:solidFill>
+              </a:rPr>
+              <a:t>1. Cost-Effective Technology Stack: </a:t>
+            </a:r>
+            <a:r>
+              <a:rPr lang="en-GB"/>
+              <a:t>By leveraging open-source technologies and frameworks like React/Next.js and Express.js, we keep development costs low while ensuring high-quality performance.</a:t>
+            </a:r>
+          </a:p>
+          <a:p>
+            <a:endParaRPr lang="en-GB"/>
+          </a:p>
+          <a:p>
+            <a:r>
+              <a:rPr lang="en-GB" b="1">
+                <a:solidFill>
+                  <a:srgbClr val="7030A0"/>
+                </a:solidFill>
+              </a:rPr>
+              <a:t>2. Scalable Architecture: </a:t>
+            </a:r>
+            <a:r>
+              <a:rPr lang="en-GB"/>
+              <a:t>The platform's design allows for seamless scaling, minimizing additional infrastructure costs as user base grows.</a:t>
+            </a:r>
+          </a:p>
+          <a:p>
+            <a:endParaRPr lang="en-GB"/>
+          </a:p>
+          <a:p>
+            <a:r>
+              <a:rPr lang="en-GB" b="1">
+                <a:solidFill>
+                  <a:srgbClr val="7030A0"/>
+                </a:solidFill>
+              </a:rPr>
+              <a:t>3. Potential Revenue Streams</a:t>
+            </a:r>
+            <a:r>
+              <a:rPr lang="en-GB">
+                <a:solidFill>
+                  <a:srgbClr val="7030A0"/>
+                </a:solidFill>
+              </a:rPr>
+              <a:t>: </a:t>
+            </a:r>
+            <a:r>
+              <a:rPr lang="en-GB"/>
+              <a:t>Opportunities for revenue generation include premium features, strategic partnerships with e-waste facilities, and potential subscription models for advanced services.</a:t>
+            </a:r>
+          </a:p>
+          <a:p>
+            <a:endParaRPr lang="en-GB"/>
+          </a:p>
+          <a:p>
+            <a:r>
+              <a:rPr lang="en-GB" b="1">
+                <a:solidFill>
+                  <a:srgbClr val="7030A0"/>
+                </a:solidFill>
+              </a:rPr>
+              <a:t>4. Grant and Funding Opportunities: </a:t>
+            </a:r>
+            <a:r>
+              <a:rPr lang="en-GB"/>
+              <a:t>Explore grants and funding programs aimed at supporting sustainable and innovative solutions in the e-waste management sector.</a:t>
+            </a:r>
+          </a:p>
+          <a:p>
+            <a:endParaRPr lang="en-GB"/>
+          </a:p>
+          <a:p>
+            <a:r>
+              <a:rPr lang="en-GB" b="1">
+                <a:solidFill>
+                  <a:srgbClr val="7030A0"/>
+                </a:solidFill>
+              </a:rPr>
+              <a:t>5. Economic Impact: </a:t>
+            </a:r>
+            <a:r>
+              <a:rPr lang="en-GB"/>
+              <a:t>By stimulating a market for recycled electronic components, the platform has the potential to contribute to economic growth in the e-waste recycling industry.</a:t>
+            </a:r>
+          </a:p>
+          <a:p>
+            <a:endParaRPr lang="en-GB"/>
+          </a:p>
+          <a:p>
+            <a:r>
+              <a:rPr lang="en-GB" b="1">
+                <a:solidFill>
+                  <a:srgbClr val="7030A0"/>
+                </a:solidFill>
+              </a:rPr>
+              <a:t>6. Operational Efficiency:</a:t>
+            </a:r>
+            <a:r>
+              <a:rPr lang="en-GB"/>
+              <a:t> Streamlined processes, including real-time verification and AI-powered assessments, optimize resource utilization and contribute to cost efficiency.</a:t>
+            </a:r>
+          </a:p>
+          <a:p>
+            <a:endParaRPr lang="en-GB"/>
+          </a:p>
+          <a:p>
+            <a:r>
+              <a:rPr lang="en-GB" b="1">
+                <a:solidFill>
+                  <a:srgbClr val="7030A0"/>
+                </a:solidFill>
+              </a:rPr>
+              <a:t>7. ROI for Facility Owners: </a:t>
+            </a:r>
+            <a:r>
+              <a:rPr lang="en-GB"/>
+              <a:t>Facility owners can benefit from increased business through the platform, potentially leading to a positive return on investment in their e-waste disposal operations.</a:t>
+            </a:r>
+            <a:endParaRPr lang="en-IN"/>
+          </a:p>
+        </p:txBody>
+      </p:sp>
+    </p:spTree>
+    <p:extLst>
+      <p:ext uri="{BB962C8B-B14F-4D97-AF65-F5344CB8AC3E}">
+        <p14:creationId xmlns:p14="http://schemas.microsoft.com/office/powerpoint/2010/main" val="2349704376"/>
+      </p:ext>
+    </p:extLst>
+  </p:cSld>
+  <p:clrMapOvr>
+    <a:masterClrMapping/>
+  </p:clrMapOvr>
+</p:sld>
+</file>
+
+<file path=ppt/slides/slide11.xml><?xml version="1.0" encoding="utf-8"?>
+<p:sld xmlns:a="http://schemas.openxmlformats.org/drawingml/2006/main" xmlns:r="http://schemas.openxmlformats.org/officeDocument/2006/relationships" xmlns:p="http://schemas.openxmlformats.org/presentationml/2006/main">
+  <p:cSld>
+    <p:spTree>
+      <p:nvGrpSpPr>
+        <p:cNvPr id="1" name=""/>
+        <p:cNvGrpSpPr/>
+        <p:nvPr/>
+      </p:nvGrpSpPr>
+      <p:grpSpPr>
+        <a:xfrm>
+          <a:off x="0" y="0"/>
+          <a:ext cx="0" cy="0"/>
+          <a:chOff x="0" y="0"/>
+          <a:chExt cx="0" cy="0"/>
+        </a:xfrm>
+      </p:grpSpPr>
+      <p:sp>
+        <p:nvSpPr>
           <p:cNvPr id="2" name="Title 1">
             <a:extLst>
               <a:ext uri="{FF2B5EF4-FFF2-40B4-BE49-F238E27FC236}">
@@ -22066,7 +22370,7 @@
 </p:sld>
 </file>
 
-<file path=ppt/slides/slide11.xml><?xml version="1.0" encoding="utf-8"?>
+<file path=ppt/slides/slide12.xml><?xml version="1.0" encoding="utf-8"?>
 <p:sld xmlns:a="http://schemas.openxmlformats.org/drawingml/2006/main" xmlns:r="http://schemas.openxmlformats.org/officeDocument/2006/relationships" xmlns:p="http://schemas.openxmlformats.org/presentationml/2006/main">
   <p:cSld>
     <p:spTree>
@@ -22156,7 +22460,7 @@
 </p:sld>
 </file>
 
-<file path=ppt/slides/slide12.xml><?xml version="1.0" encoding="utf-8"?>
+<file path=ppt/slides/slide13.xml><?xml version="1.0" encoding="utf-8"?>
 <p:sld xmlns:a="http://schemas.openxmlformats.org/drawingml/2006/main" xmlns:r="http://schemas.openxmlformats.org/officeDocument/2006/relationships" xmlns:p="http://schemas.openxmlformats.org/presentationml/2006/main">
   <p:cSld>
     <p:spTree>
@@ -22379,7 +22683,7 @@
 </p:sld>
 </file>
 
-<file path=ppt/slides/slide13.xml><?xml version="1.0" encoding="utf-8"?>
+<file path=ppt/slides/slide14.xml><?xml version="1.0" encoding="utf-8"?>
 <p:sld xmlns:a="http://schemas.openxmlformats.org/drawingml/2006/main" xmlns:r="http://schemas.openxmlformats.org/officeDocument/2006/relationships" xmlns:p="http://schemas.openxmlformats.org/presentationml/2006/main">
   <p:cSld>
     <p:spTree>
@@ -22449,6 +22753,1915 @@
 </file>
 
 <file path=ppt/slides/slide2.xml><?xml version="1.0" encoding="utf-8"?>
+<p:sld xmlns:a="http://schemas.openxmlformats.org/drawingml/2006/main" xmlns:r="http://schemas.openxmlformats.org/officeDocument/2006/relationships" xmlns:p="http://schemas.openxmlformats.org/presentationml/2006/main">
+  <p:cSld>
+    <p:spTree>
+      <p:nvGrpSpPr>
+        <p:cNvPr id="1" name=""/>
+        <p:cNvGrpSpPr/>
+        <p:nvPr/>
+      </p:nvGrpSpPr>
+      <p:grpSpPr>
+        <a:xfrm>
+          <a:off x="0" y="0"/>
+          <a:ext cx="0" cy="0"/>
+          <a:chOff x="0" y="0"/>
+          <a:chExt cx="0" cy="0"/>
+        </a:xfrm>
+      </p:grpSpPr>
+      <p:pic>
+        <p:nvPicPr>
+          <p:cNvPr id="31" name="Picture Placeholder 30"/>
+          <p:cNvPicPr>
+            <a:picLocks noGrp="1" noChangeAspect="1"/>
+          </p:cNvPicPr>
+          <p:nvPr>
+            <p:ph type="pic" sz="quarter" idx="17"/>
+          </p:nvPr>
+        </p:nvPicPr>
+        <p:blipFill rotWithShape="1">
+          <a:blip r:embed="rId3" cstate="print">
+            <a:extLst>
+              <a:ext uri="{28A0092B-C50C-407E-A947-70E740481C1C}">
+                <a14:useLocalDpi xmlns:a14="http://schemas.microsoft.com/office/drawing/2010/main" val="0"/>
+              </a:ext>
+            </a:extLst>
+          </a:blip>
+          <a:srcRect l="21583" r="28867"/>
+          <a:stretch/>
+        </p:blipFill>
+        <p:spPr/>
+      </p:pic>
+      <p:sp>
+        <p:nvSpPr>
+          <p:cNvPr id="6" name="Text Placeholder 5"/>
+          <p:cNvSpPr>
+            <a:spLocks noGrp="1"/>
+          </p:cNvSpPr>
+          <p:nvPr>
+            <p:ph type="body" sz="quarter" idx="12"/>
+          </p:nvPr>
+        </p:nvSpPr>
+        <p:spPr>
+          <a:xfrm>
+            <a:off x="604738" y="2001581"/>
+            <a:ext cx="5201702" cy="268656"/>
+          </a:xfrm>
+        </p:spPr>
+        <p:txBody>
+          <a:bodyPr wrap="none"/>
+          <a:lstStyle/>
+          <a:p>
+            <a:pPr>
+              <a:lnSpc>
+                <a:spcPct val="100000"/>
+              </a:lnSpc>
+            </a:pPr>
+            <a:r>
+              <a:rPr lang="en-IN"/>
+              <a:t>Team Details</a:t>
+            </a:r>
+            <a:endParaRPr lang="en-IN">
+              <a:solidFill>
+                <a:srgbClr val="FF0000"/>
+              </a:solidFill>
+            </a:endParaRPr>
+          </a:p>
+        </p:txBody>
+      </p:sp>
+      <p:sp>
+        <p:nvSpPr>
+          <p:cNvPr id="5" name="Title 4"/>
+          <p:cNvSpPr>
+            <a:spLocks noGrp="1"/>
+          </p:cNvSpPr>
+          <p:nvPr>
+            <p:ph type="title"/>
+          </p:nvPr>
+        </p:nvSpPr>
+        <p:spPr/>
+        <p:txBody>
+          <a:bodyPr/>
+          <a:lstStyle/>
+          <a:p>
+            <a:r>
+              <a:rPr lang="en-IN"/>
+              <a:t>Table of Contents</a:t>
+            </a:r>
+          </a:p>
+        </p:txBody>
+      </p:sp>
+      <p:sp>
+        <p:nvSpPr>
+          <p:cNvPr id="7" name="Text Placeholder 6"/>
+          <p:cNvSpPr>
+            <a:spLocks noGrp="1"/>
+          </p:cNvSpPr>
+          <p:nvPr>
+            <p:ph type="body" sz="quarter" idx="13"/>
+          </p:nvPr>
+        </p:nvSpPr>
+        <p:spPr>
+          <a:xfrm>
+            <a:off x="604738" y="2416829"/>
+            <a:ext cx="5201702" cy="268656"/>
+          </a:xfrm>
+        </p:spPr>
+        <p:txBody>
+          <a:bodyPr wrap="none">
+            <a:normAutofit/>
+          </a:bodyPr>
+          <a:lstStyle/>
+          <a:p>
+            <a:pPr>
+              <a:lnSpc>
+                <a:spcPct val="100000"/>
+              </a:lnSpc>
+            </a:pPr>
+            <a:r>
+              <a:rPr lang="en-IN"/>
+              <a:t>Problem Statement</a:t>
+            </a:r>
+          </a:p>
+        </p:txBody>
+      </p:sp>
+      <p:sp>
+        <p:nvSpPr>
+          <p:cNvPr id="8" name="Text Placeholder 7"/>
+          <p:cNvSpPr>
+            <a:spLocks noGrp="1"/>
+          </p:cNvSpPr>
+          <p:nvPr>
+            <p:ph type="body" sz="quarter" idx="14"/>
+          </p:nvPr>
+        </p:nvSpPr>
+        <p:spPr>
+          <a:xfrm>
+            <a:off x="604738" y="2811981"/>
+            <a:ext cx="5201702" cy="268656"/>
+          </a:xfrm>
+        </p:spPr>
+        <p:txBody>
+          <a:bodyPr wrap="none">
+            <a:normAutofit/>
+          </a:bodyPr>
+          <a:lstStyle/>
+          <a:p>
+            <a:pPr>
+              <a:lnSpc>
+                <a:spcPct val="100000"/>
+              </a:lnSpc>
+            </a:pPr>
+            <a:r>
+              <a:rPr lang="en-US"/>
+              <a:t>What is your idea for the solution?</a:t>
+            </a:r>
+            <a:endParaRPr lang="en-IN"/>
+          </a:p>
+        </p:txBody>
+      </p:sp>
+      <p:sp>
+        <p:nvSpPr>
+          <p:cNvPr id="9" name="Text Placeholder 8"/>
+          <p:cNvSpPr>
+            <a:spLocks noGrp="1"/>
+          </p:cNvSpPr>
+          <p:nvPr>
+            <p:ph type="body" sz="quarter" idx="15"/>
+          </p:nvPr>
+        </p:nvSpPr>
+        <p:spPr>
+          <a:xfrm>
+            <a:off x="604738" y="3207133"/>
+            <a:ext cx="5201702" cy="268656"/>
+          </a:xfrm>
+        </p:spPr>
+        <p:txBody>
+          <a:bodyPr wrap="none">
+            <a:normAutofit/>
+          </a:bodyPr>
+          <a:lstStyle/>
+          <a:p>
+            <a:pPr>
+              <a:lnSpc>
+                <a:spcPct val="100000"/>
+              </a:lnSpc>
+            </a:pPr>
+            <a:r>
+              <a:rPr lang="en-US"/>
+              <a:t>What domains does it address? What is the impact?</a:t>
+            </a:r>
+          </a:p>
+        </p:txBody>
+      </p:sp>
+      <p:cxnSp>
+        <p:nvCxnSpPr>
+          <p:cNvPr id="13" name="Straight Connector 12">
+            <a:extLst>
+              <a:ext uri="{FF2B5EF4-FFF2-40B4-BE49-F238E27FC236}">
+                <a16:creationId xmlns:a16="http://schemas.microsoft.com/office/drawing/2014/main" id="{BDD4130D-5D11-41DB-915E-62F762A67CC1}"/>
+              </a:ext>
+            </a:extLst>
+          </p:cNvPr>
+          <p:cNvCxnSpPr>
+            <a:cxnSpLocks/>
+          </p:cNvCxnSpPr>
+          <p:nvPr/>
+        </p:nvCxnSpPr>
+        <p:spPr>
+          <a:xfrm>
+            <a:off x="604738" y="2333485"/>
+            <a:ext cx="5201702" cy="0"/>
+          </a:xfrm>
+          <a:prstGeom prst="line">
+            <a:avLst/>
+          </a:prstGeom>
+          <a:ln>
+            <a:solidFill>
+              <a:schemeClr val="bg1">
+                <a:lumMod val="85000"/>
+              </a:schemeClr>
+            </a:solidFill>
+          </a:ln>
+        </p:spPr>
+        <p:style>
+          <a:lnRef idx="1">
+            <a:schemeClr val="accent1"/>
+          </a:lnRef>
+          <a:fillRef idx="0">
+            <a:schemeClr val="accent1"/>
+          </a:fillRef>
+          <a:effectRef idx="0">
+            <a:schemeClr val="accent1"/>
+          </a:effectRef>
+          <a:fontRef idx="minor">
+            <a:schemeClr val="tx1"/>
+          </a:fontRef>
+        </p:style>
+      </p:cxnSp>
+      <p:cxnSp>
+        <p:nvCxnSpPr>
+          <p:cNvPr id="14" name="Straight Connector 13">
+            <a:extLst>
+              <a:ext uri="{FF2B5EF4-FFF2-40B4-BE49-F238E27FC236}">
+                <a16:creationId xmlns:a16="http://schemas.microsoft.com/office/drawing/2014/main" id="{B98DCB7C-E14A-4EFB-B6A0-318ADCDFF1B7}"/>
+              </a:ext>
+            </a:extLst>
+          </p:cNvPr>
+          <p:cNvCxnSpPr>
+            <a:cxnSpLocks/>
+          </p:cNvCxnSpPr>
+          <p:nvPr/>
+        </p:nvCxnSpPr>
+        <p:spPr>
+          <a:xfrm>
+            <a:off x="604738" y="2728637"/>
+            <a:ext cx="5201702" cy="0"/>
+          </a:xfrm>
+          <a:prstGeom prst="line">
+            <a:avLst/>
+          </a:prstGeom>
+          <a:ln>
+            <a:solidFill>
+              <a:schemeClr val="bg1">
+                <a:lumMod val="85000"/>
+              </a:schemeClr>
+            </a:solidFill>
+          </a:ln>
+        </p:spPr>
+        <p:style>
+          <a:lnRef idx="1">
+            <a:schemeClr val="accent1"/>
+          </a:lnRef>
+          <a:fillRef idx="0">
+            <a:schemeClr val="accent1"/>
+          </a:fillRef>
+          <a:effectRef idx="0">
+            <a:schemeClr val="accent1"/>
+          </a:effectRef>
+          <a:fontRef idx="minor">
+            <a:schemeClr val="tx1"/>
+          </a:fontRef>
+        </p:style>
+      </p:cxnSp>
+      <p:cxnSp>
+        <p:nvCxnSpPr>
+          <p:cNvPr id="15" name="Straight Connector 14">
+            <a:extLst>
+              <a:ext uri="{FF2B5EF4-FFF2-40B4-BE49-F238E27FC236}">
+                <a16:creationId xmlns:a16="http://schemas.microsoft.com/office/drawing/2014/main" id="{1B736775-071F-4642-9BC7-146D6A2B4561}"/>
+              </a:ext>
+            </a:extLst>
+          </p:cNvPr>
+          <p:cNvCxnSpPr>
+            <a:cxnSpLocks/>
+          </p:cNvCxnSpPr>
+          <p:nvPr/>
+        </p:nvCxnSpPr>
+        <p:spPr>
+          <a:xfrm>
+            <a:off x="604738" y="3123789"/>
+            <a:ext cx="5201702" cy="0"/>
+          </a:xfrm>
+          <a:prstGeom prst="line">
+            <a:avLst/>
+          </a:prstGeom>
+          <a:ln>
+            <a:solidFill>
+              <a:schemeClr val="bg1">
+                <a:lumMod val="85000"/>
+              </a:schemeClr>
+            </a:solidFill>
+          </a:ln>
+        </p:spPr>
+        <p:style>
+          <a:lnRef idx="1">
+            <a:schemeClr val="accent1"/>
+          </a:lnRef>
+          <a:fillRef idx="0">
+            <a:schemeClr val="accent1"/>
+          </a:fillRef>
+          <a:effectRef idx="0">
+            <a:schemeClr val="accent1"/>
+          </a:effectRef>
+          <a:fontRef idx="minor">
+            <a:schemeClr val="tx1"/>
+          </a:fontRef>
+        </p:style>
+      </p:cxnSp>
+      <p:cxnSp>
+        <p:nvCxnSpPr>
+          <p:cNvPr id="16" name="Straight Connector 15">
+            <a:extLst>
+              <a:ext uri="{FF2B5EF4-FFF2-40B4-BE49-F238E27FC236}">
+                <a16:creationId xmlns:a16="http://schemas.microsoft.com/office/drawing/2014/main" id="{C80BD5A8-54C1-481B-9A15-A3020848A95F}"/>
+              </a:ext>
+            </a:extLst>
+          </p:cNvPr>
+          <p:cNvCxnSpPr>
+            <a:cxnSpLocks/>
+          </p:cNvCxnSpPr>
+          <p:nvPr/>
+        </p:nvCxnSpPr>
+        <p:spPr>
+          <a:xfrm>
+            <a:off x="604738" y="3518941"/>
+            <a:ext cx="5201702" cy="0"/>
+          </a:xfrm>
+          <a:prstGeom prst="line">
+            <a:avLst/>
+          </a:prstGeom>
+          <a:ln>
+            <a:solidFill>
+              <a:schemeClr val="bg1">
+                <a:lumMod val="85000"/>
+              </a:schemeClr>
+            </a:solidFill>
+          </a:ln>
+        </p:spPr>
+        <p:style>
+          <a:lnRef idx="1">
+            <a:schemeClr val="accent1"/>
+          </a:lnRef>
+          <a:fillRef idx="0">
+            <a:schemeClr val="accent1"/>
+          </a:fillRef>
+          <a:effectRef idx="0">
+            <a:schemeClr val="accent1"/>
+          </a:effectRef>
+          <a:fontRef idx="minor">
+            <a:schemeClr val="tx1"/>
+          </a:fontRef>
+        </p:style>
+      </p:cxnSp>
+      <p:cxnSp>
+        <p:nvCxnSpPr>
+          <p:cNvPr id="17" name="Straight Connector 16">
+            <a:extLst>
+              <a:ext uri="{FF2B5EF4-FFF2-40B4-BE49-F238E27FC236}">
+                <a16:creationId xmlns:a16="http://schemas.microsoft.com/office/drawing/2014/main" id="{BDD4130D-5D11-41DB-915E-62F762A67CC1}"/>
+              </a:ext>
+            </a:extLst>
+          </p:cNvPr>
+          <p:cNvCxnSpPr>
+            <a:cxnSpLocks/>
+          </p:cNvCxnSpPr>
+          <p:nvPr/>
+        </p:nvCxnSpPr>
+        <p:spPr>
+          <a:xfrm>
+            <a:off x="604738" y="3914093"/>
+            <a:ext cx="5201702" cy="0"/>
+          </a:xfrm>
+          <a:prstGeom prst="line">
+            <a:avLst/>
+          </a:prstGeom>
+          <a:ln>
+            <a:solidFill>
+              <a:schemeClr val="bg1">
+                <a:lumMod val="85000"/>
+              </a:schemeClr>
+            </a:solidFill>
+          </a:ln>
+        </p:spPr>
+        <p:style>
+          <a:lnRef idx="1">
+            <a:schemeClr val="accent1"/>
+          </a:lnRef>
+          <a:fillRef idx="0">
+            <a:schemeClr val="accent1"/>
+          </a:fillRef>
+          <a:effectRef idx="0">
+            <a:schemeClr val="accent1"/>
+          </a:effectRef>
+          <a:fontRef idx="minor">
+            <a:schemeClr val="tx1"/>
+          </a:fontRef>
+        </p:style>
+      </p:cxnSp>
+      <p:cxnSp>
+        <p:nvCxnSpPr>
+          <p:cNvPr id="18" name="Straight Connector 17">
+            <a:extLst>
+              <a:ext uri="{FF2B5EF4-FFF2-40B4-BE49-F238E27FC236}">
+                <a16:creationId xmlns:a16="http://schemas.microsoft.com/office/drawing/2014/main" id="{B98DCB7C-E14A-4EFB-B6A0-318ADCDFF1B7}"/>
+              </a:ext>
+            </a:extLst>
+          </p:cNvPr>
+          <p:cNvCxnSpPr>
+            <a:cxnSpLocks/>
+          </p:cNvCxnSpPr>
+          <p:nvPr/>
+        </p:nvCxnSpPr>
+        <p:spPr>
+          <a:xfrm>
+            <a:off x="604738" y="4309245"/>
+            <a:ext cx="5201702" cy="0"/>
+          </a:xfrm>
+          <a:prstGeom prst="line">
+            <a:avLst/>
+          </a:prstGeom>
+          <a:ln>
+            <a:solidFill>
+              <a:schemeClr val="bg1">
+                <a:lumMod val="85000"/>
+              </a:schemeClr>
+            </a:solidFill>
+          </a:ln>
+        </p:spPr>
+        <p:style>
+          <a:lnRef idx="1">
+            <a:schemeClr val="accent1"/>
+          </a:lnRef>
+          <a:fillRef idx="0">
+            <a:schemeClr val="accent1"/>
+          </a:fillRef>
+          <a:effectRef idx="0">
+            <a:schemeClr val="accent1"/>
+          </a:effectRef>
+          <a:fontRef idx="minor">
+            <a:schemeClr val="tx1"/>
+          </a:fontRef>
+        </p:style>
+      </p:cxnSp>
+      <p:cxnSp>
+        <p:nvCxnSpPr>
+          <p:cNvPr id="19" name="Straight Connector 18">
+            <a:extLst>
+              <a:ext uri="{FF2B5EF4-FFF2-40B4-BE49-F238E27FC236}">
+                <a16:creationId xmlns:a16="http://schemas.microsoft.com/office/drawing/2014/main" id="{1B736775-071F-4642-9BC7-146D6A2B4561}"/>
+              </a:ext>
+            </a:extLst>
+          </p:cNvPr>
+          <p:cNvCxnSpPr>
+            <a:cxnSpLocks/>
+          </p:cNvCxnSpPr>
+          <p:nvPr/>
+        </p:nvCxnSpPr>
+        <p:spPr>
+          <a:xfrm>
+            <a:off x="604738" y="4704397"/>
+            <a:ext cx="5201702" cy="0"/>
+          </a:xfrm>
+          <a:prstGeom prst="line">
+            <a:avLst/>
+          </a:prstGeom>
+          <a:ln>
+            <a:solidFill>
+              <a:schemeClr val="bg1">
+                <a:lumMod val="85000"/>
+              </a:schemeClr>
+            </a:solidFill>
+          </a:ln>
+        </p:spPr>
+        <p:style>
+          <a:lnRef idx="1">
+            <a:schemeClr val="accent1"/>
+          </a:lnRef>
+          <a:fillRef idx="0">
+            <a:schemeClr val="accent1"/>
+          </a:fillRef>
+          <a:effectRef idx="0">
+            <a:schemeClr val="accent1"/>
+          </a:effectRef>
+          <a:fontRef idx="minor">
+            <a:schemeClr val="tx1"/>
+          </a:fontRef>
+        </p:style>
+      </p:cxnSp>
+      <p:cxnSp>
+        <p:nvCxnSpPr>
+          <p:cNvPr id="20" name="Straight Connector 19">
+            <a:extLst>
+              <a:ext uri="{FF2B5EF4-FFF2-40B4-BE49-F238E27FC236}">
+                <a16:creationId xmlns:a16="http://schemas.microsoft.com/office/drawing/2014/main" id="{C80BD5A8-54C1-481B-9A15-A3020848A95F}"/>
+              </a:ext>
+            </a:extLst>
+          </p:cNvPr>
+          <p:cNvCxnSpPr>
+            <a:cxnSpLocks/>
+          </p:cNvCxnSpPr>
+          <p:nvPr/>
+        </p:nvCxnSpPr>
+        <p:spPr>
+          <a:xfrm>
+            <a:off x="604738" y="5099549"/>
+            <a:ext cx="5201702" cy="0"/>
+          </a:xfrm>
+          <a:prstGeom prst="line">
+            <a:avLst/>
+          </a:prstGeom>
+          <a:ln>
+            <a:solidFill>
+              <a:schemeClr val="bg1">
+                <a:lumMod val="85000"/>
+              </a:schemeClr>
+            </a:solidFill>
+          </a:ln>
+        </p:spPr>
+        <p:style>
+          <a:lnRef idx="1">
+            <a:schemeClr val="accent1"/>
+          </a:lnRef>
+          <a:fillRef idx="0">
+            <a:schemeClr val="accent1"/>
+          </a:fillRef>
+          <a:effectRef idx="0">
+            <a:schemeClr val="accent1"/>
+          </a:effectRef>
+          <a:fontRef idx="minor">
+            <a:schemeClr val="tx1"/>
+          </a:fontRef>
+        </p:style>
+      </p:cxnSp>
+      <p:sp>
+        <p:nvSpPr>
+          <p:cNvPr id="21" name="Text Placeholder 8"/>
+          <p:cNvSpPr txBox="1">
+            <a:spLocks/>
+          </p:cNvSpPr>
+          <p:nvPr/>
+        </p:nvSpPr>
+        <p:spPr>
+          <a:xfrm>
+            <a:off x="604738" y="4389396"/>
+            <a:ext cx="5201702" cy="268656"/>
+          </a:xfrm>
+          <a:prstGeom prst="rect">
+            <a:avLst/>
+          </a:prstGeom>
+        </p:spPr>
+        <p:txBody>
+          <a:bodyPr vert="horz" wrap="none" lIns="0" tIns="0" rIns="0" bIns="0" rtlCol="0">
+            <a:normAutofit/>
+          </a:bodyPr>
+          <a:lstStyle>
+            <a:lvl1pPr marL="0" indent="0" algn="l" defTabSz="914400" rtl="0" eaLnBrk="1" latinLnBrk="0" hangingPunct="1">
+              <a:lnSpc>
+                <a:spcPct val="90000"/>
+              </a:lnSpc>
+              <a:spcBef>
+                <a:spcPts val="1000"/>
+              </a:spcBef>
+              <a:buFont typeface="Arial" panose="020B0604020202020204" pitchFamily="34" charset="0"/>
+              <a:buNone/>
+              <a:defRPr lang="en-IN" sz="1400" kern="1200" dirty="0">
+                <a:solidFill>
+                  <a:schemeClr val="accent4">
+                    <a:lumMod val="75000"/>
+                    <a:lumOff val="25000"/>
+                  </a:schemeClr>
+                </a:solidFill>
+                <a:latin typeface="Segoe UI" panose="020B0502040204020203" pitchFamily="34" charset="0"/>
+                <a:ea typeface="+mn-ea"/>
+                <a:cs typeface="+mn-cs"/>
+              </a:defRPr>
+            </a:lvl1pPr>
+            <a:lvl2pPr marL="457200" indent="0" algn="l" defTabSz="914400" rtl="0" eaLnBrk="1" latinLnBrk="0" hangingPunct="1">
+              <a:lnSpc>
+                <a:spcPct val="90000"/>
+              </a:lnSpc>
+              <a:spcBef>
+                <a:spcPts val="500"/>
+              </a:spcBef>
+              <a:buFont typeface="Arial" panose="020B0604020202020204" pitchFamily="34" charset="0"/>
+              <a:buNone/>
+              <a:defRPr sz="1850" kern="1200">
+                <a:solidFill>
+                  <a:schemeClr val="accent4">
+                    <a:lumMod val="75000"/>
+                    <a:lumOff val="25000"/>
+                  </a:schemeClr>
+                </a:solidFill>
+                <a:latin typeface="+mj-lt"/>
+                <a:ea typeface="+mn-ea"/>
+                <a:cs typeface="+mn-cs"/>
+              </a:defRPr>
+            </a:lvl2pPr>
+            <a:lvl3pPr marL="914400" indent="0" algn="l" defTabSz="914400" rtl="0" eaLnBrk="1" latinLnBrk="0" hangingPunct="1">
+              <a:lnSpc>
+                <a:spcPct val="90000"/>
+              </a:lnSpc>
+              <a:spcBef>
+                <a:spcPts val="500"/>
+              </a:spcBef>
+              <a:buFont typeface="Arial" panose="020B0604020202020204" pitchFamily="34" charset="0"/>
+              <a:buNone/>
+              <a:defRPr sz="1850" kern="1200">
+                <a:solidFill>
+                  <a:schemeClr val="accent4">
+                    <a:lumMod val="75000"/>
+                    <a:lumOff val="25000"/>
+                  </a:schemeClr>
+                </a:solidFill>
+                <a:latin typeface="+mj-lt"/>
+                <a:ea typeface="+mn-ea"/>
+                <a:cs typeface="+mn-cs"/>
+              </a:defRPr>
+            </a:lvl3pPr>
+            <a:lvl4pPr marL="1371600" indent="0" algn="l" defTabSz="914400" rtl="0" eaLnBrk="1" latinLnBrk="0" hangingPunct="1">
+              <a:lnSpc>
+                <a:spcPct val="90000"/>
+              </a:lnSpc>
+              <a:spcBef>
+                <a:spcPts val="500"/>
+              </a:spcBef>
+              <a:buFont typeface="Arial" panose="020B0604020202020204" pitchFamily="34" charset="0"/>
+              <a:buNone/>
+              <a:defRPr sz="1850" kern="1200">
+                <a:solidFill>
+                  <a:schemeClr val="accent4">
+                    <a:lumMod val="75000"/>
+                    <a:lumOff val="25000"/>
+                  </a:schemeClr>
+                </a:solidFill>
+                <a:latin typeface="+mj-lt"/>
+                <a:ea typeface="+mn-ea"/>
+                <a:cs typeface="+mn-cs"/>
+              </a:defRPr>
+            </a:lvl4pPr>
+            <a:lvl5pPr marL="1828800" indent="0" algn="l" defTabSz="914400" rtl="0" eaLnBrk="1" latinLnBrk="0" hangingPunct="1">
+              <a:lnSpc>
+                <a:spcPct val="90000"/>
+              </a:lnSpc>
+              <a:spcBef>
+                <a:spcPts val="500"/>
+              </a:spcBef>
+              <a:buFont typeface="Arial" panose="020B0604020202020204" pitchFamily="34" charset="0"/>
+              <a:buNone/>
+              <a:defRPr sz="1850" kern="1200">
+                <a:solidFill>
+                  <a:schemeClr val="accent4">
+                    <a:lumMod val="75000"/>
+                    <a:lumOff val="25000"/>
+                  </a:schemeClr>
+                </a:solidFill>
+                <a:latin typeface="+mj-lt"/>
+                <a:ea typeface="+mn-ea"/>
+                <a:cs typeface="+mn-cs"/>
+              </a:defRPr>
+            </a:lvl5pPr>
+            <a:lvl6pPr marL="2514600" indent="-228600" algn="l" defTabSz="914400" rtl="0" eaLnBrk="1" latinLnBrk="0" hangingPunct="1">
+              <a:lnSpc>
+                <a:spcPct val="90000"/>
+              </a:lnSpc>
+              <a:spcBef>
+                <a:spcPts val="500"/>
+              </a:spcBef>
+              <a:buFont typeface="Arial" panose="020B0604020202020204" pitchFamily="34" charset="0"/>
+              <a:buChar char="•"/>
+              <a:defRPr sz="1800" kern="1200">
+                <a:solidFill>
+                  <a:schemeClr val="tx1"/>
+                </a:solidFill>
+                <a:latin typeface="+mn-lt"/>
+                <a:ea typeface="+mn-ea"/>
+                <a:cs typeface="+mn-cs"/>
+              </a:defRPr>
+            </a:lvl6pPr>
+            <a:lvl7pPr marL="2971800" indent="-228600" algn="l" defTabSz="914400" rtl="0" eaLnBrk="1" latinLnBrk="0" hangingPunct="1">
+              <a:lnSpc>
+                <a:spcPct val="90000"/>
+              </a:lnSpc>
+              <a:spcBef>
+                <a:spcPts val="500"/>
+              </a:spcBef>
+              <a:buFont typeface="Arial" panose="020B0604020202020204" pitchFamily="34" charset="0"/>
+              <a:buChar char="•"/>
+              <a:defRPr sz="1800" kern="1200">
+                <a:solidFill>
+                  <a:schemeClr val="tx1"/>
+                </a:solidFill>
+                <a:latin typeface="+mn-lt"/>
+                <a:ea typeface="+mn-ea"/>
+                <a:cs typeface="+mn-cs"/>
+              </a:defRPr>
+            </a:lvl7pPr>
+            <a:lvl8pPr marL="3429000" indent="-228600" algn="l" defTabSz="914400" rtl="0" eaLnBrk="1" latinLnBrk="0" hangingPunct="1">
+              <a:lnSpc>
+                <a:spcPct val="90000"/>
+              </a:lnSpc>
+              <a:spcBef>
+                <a:spcPts val="500"/>
+              </a:spcBef>
+              <a:buFont typeface="Arial" panose="020B0604020202020204" pitchFamily="34" charset="0"/>
+              <a:buChar char="•"/>
+              <a:defRPr sz="1800" kern="1200">
+                <a:solidFill>
+                  <a:schemeClr val="tx1"/>
+                </a:solidFill>
+                <a:latin typeface="+mn-lt"/>
+                <a:ea typeface="+mn-ea"/>
+                <a:cs typeface="+mn-cs"/>
+              </a:defRPr>
+            </a:lvl8pPr>
+            <a:lvl9pPr marL="3886200" indent="-228600" algn="l" defTabSz="914400" rtl="0" eaLnBrk="1" latinLnBrk="0" hangingPunct="1">
+              <a:lnSpc>
+                <a:spcPct val="90000"/>
+              </a:lnSpc>
+              <a:spcBef>
+                <a:spcPts val="500"/>
+              </a:spcBef>
+              <a:buFont typeface="Arial" panose="020B0604020202020204" pitchFamily="34" charset="0"/>
+              <a:buChar char="•"/>
+              <a:defRPr sz="1800" kern="1200">
+                <a:solidFill>
+                  <a:schemeClr val="tx1"/>
+                </a:solidFill>
+                <a:latin typeface="+mn-lt"/>
+                <a:ea typeface="+mn-ea"/>
+                <a:cs typeface="+mn-cs"/>
+              </a:defRPr>
+            </a:lvl9pPr>
+          </a:lstStyle>
+          <a:p>
+            <a:pPr>
+              <a:lnSpc>
+                <a:spcPct val="100000"/>
+              </a:lnSpc>
+            </a:pPr>
+            <a:r>
+              <a:rPr lang="en-US"/>
+              <a:t>Technical Feasibility</a:t>
+            </a:r>
+          </a:p>
+        </p:txBody>
+      </p:sp>
+      <p:sp>
+        <p:nvSpPr>
+          <p:cNvPr id="22" name="Text Placeholder 8"/>
+          <p:cNvSpPr txBox="1">
+            <a:spLocks/>
+          </p:cNvSpPr>
+          <p:nvPr/>
+        </p:nvSpPr>
+        <p:spPr>
+          <a:xfrm>
+            <a:off x="604738" y="4740061"/>
+            <a:ext cx="5201702" cy="268656"/>
+          </a:xfrm>
+          <a:prstGeom prst="rect">
+            <a:avLst/>
+          </a:prstGeom>
+        </p:spPr>
+        <p:txBody>
+          <a:bodyPr vert="horz" wrap="none" lIns="0" tIns="0" rIns="0" bIns="0" rtlCol="0">
+            <a:normAutofit/>
+          </a:bodyPr>
+          <a:lstStyle>
+            <a:lvl1pPr marL="0" indent="0" algn="l" defTabSz="914400" rtl="0" eaLnBrk="1" latinLnBrk="0" hangingPunct="1">
+              <a:lnSpc>
+                <a:spcPct val="90000"/>
+              </a:lnSpc>
+              <a:spcBef>
+                <a:spcPts val="1000"/>
+              </a:spcBef>
+              <a:buFont typeface="Arial" panose="020B0604020202020204" pitchFamily="34" charset="0"/>
+              <a:buNone/>
+              <a:defRPr lang="en-IN" sz="1400" kern="1200" dirty="0">
+                <a:solidFill>
+                  <a:schemeClr val="accent4">
+                    <a:lumMod val="75000"/>
+                    <a:lumOff val="25000"/>
+                  </a:schemeClr>
+                </a:solidFill>
+                <a:latin typeface="Segoe UI" panose="020B0502040204020203" pitchFamily="34" charset="0"/>
+                <a:ea typeface="+mn-ea"/>
+                <a:cs typeface="+mn-cs"/>
+              </a:defRPr>
+            </a:lvl1pPr>
+            <a:lvl2pPr marL="457200" indent="0" algn="l" defTabSz="914400" rtl="0" eaLnBrk="1" latinLnBrk="0" hangingPunct="1">
+              <a:lnSpc>
+                <a:spcPct val="90000"/>
+              </a:lnSpc>
+              <a:spcBef>
+                <a:spcPts val="500"/>
+              </a:spcBef>
+              <a:buFont typeface="Arial" panose="020B0604020202020204" pitchFamily="34" charset="0"/>
+              <a:buNone/>
+              <a:defRPr sz="1850" kern="1200">
+                <a:solidFill>
+                  <a:schemeClr val="accent4">
+                    <a:lumMod val="75000"/>
+                    <a:lumOff val="25000"/>
+                  </a:schemeClr>
+                </a:solidFill>
+                <a:latin typeface="+mj-lt"/>
+                <a:ea typeface="+mn-ea"/>
+                <a:cs typeface="+mn-cs"/>
+              </a:defRPr>
+            </a:lvl2pPr>
+            <a:lvl3pPr marL="914400" indent="0" algn="l" defTabSz="914400" rtl="0" eaLnBrk="1" latinLnBrk="0" hangingPunct="1">
+              <a:lnSpc>
+                <a:spcPct val="90000"/>
+              </a:lnSpc>
+              <a:spcBef>
+                <a:spcPts val="500"/>
+              </a:spcBef>
+              <a:buFont typeface="Arial" panose="020B0604020202020204" pitchFamily="34" charset="0"/>
+              <a:buNone/>
+              <a:defRPr sz="1850" kern="1200">
+                <a:solidFill>
+                  <a:schemeClr val="accent4">
+                    <a:lumMod val="75000"/>
+                    <a:lumOff val="25000"/>
+                  </a:schemeClr>
+                </a:solidFill>
+                <a:latin typeface="+mj-lt"/>
+                <a:ea typeface="+mn-ea"/>
+                <a:cs typeface="+mn-cs"/>
+              </a:defRPr>
+            </a:lvl3pPr>
+            <a:lvl4pPr marL="1371600" indent="0" algn="l" defTabSz="914400" rtl="0" eaLnBrk="1" latinLnBrk="0" hangingPunct="1">
+              <a:lnSpc>
+                <a:spcPct val="90000"/>
+              </a:lnSpc>
+              <a:spcBef>
+                <a:spcPts val="500"/>
+              </a:spcBef>
+              <a:buFont typeface="Arial" panose="020B0604020202020204" pitchFamily="34" charset="0"/>
+              <a:buNone/>
+              <a:defRPr sz="1850" kern="1200">
+                <a:solidFill>
+                  <a:schemeClr val="accent4">
+                    <a:lumMod val="75000"/>
+                    <a:lumOff val="25000"/>
+                  </a:schemeClr>
+                </a:solidFill>
+                <a:latin typeface="+mj-lt"/>
+                <a:ea typeface="+mn-ea"/>
+                <a:cs typeface="+mn-cs"/>
+              </a:defRPr>
+            </a:lvl4pPr>
+            <a:lvl5pPr marL="1828800" indent="0" algn="l" defTabSz="914400" rtl="0" eaLnBrk="1" latinLnBrk="0" hangingPunct="1">
+              <a:lnSpc>
+                <a:spcPct val="90000"/>
+              </a:lnSpc>
+              <a:spcBef>
+                <a:spcPts val="500"/>
+              </a:spcBef>
+              <a:buFont typeface="Arial" panose="020B0604020202020204" pitchFamily="34" charset="0"/>
+              <a:buNone/>
+              <a:defRPr sz="1850" kern="1200">
+                <a:solidFill>
+                  <a:schemeClr val="accent4">
+                    <a:lumMod val="75000"/>
+                    <a:lumOff val="25000"/>
+                  </a:schemeClr>
+                </a:solidFill>
+                <a:latin typeface="+mj-lt"/>
+                <a:ea typeface="+mn-ea"/>
+                <a:cs typeface="+mn-cs"/>
+              </a:defRPr>
+            </a:lvl5pPr>
+            <a:lvl6pPr marL="2514600" indent="-228600" algn="l" defTabSz="914400" rtl="0" eaLnBrk="1" latinLnBrk="0" hangingPunct="1">
+              <a:lnSpc>
+                <a:spcPct val="90000"/>
+              </a:lnSpc>
+              <a:spcBef>
+                <a:spcPts val="500"/>
+              </a:spcBef>
+              <a:buFont typeface="Arial" panose="020B0604020202020204" pitchFamily="34" charset="0"/>
+              <a:buChar char="•"/>
+              <a:defRPr sz="1800" kern="1200">
+                <a:solidFill>
+                  <a:schemeClr val="tx1"/>
+                </a:solidFill>
+                <a:latin typeface="+mn-lt"/>
+                <a:ea typeface="+mn-ea"/>
+                <a:cs typeface="+mn-cs"/>
+              </a:defRPr>
+            </a:lvl6pPr>
+            <a:lvl7pPr marL="2971800" indent="-228600" algn="l" defTabSz="914400" rtl="0" eaLnBrk="1" latinLnBrk="0" hangingPunct="1">
+              <a:lnSpc>
+                <a:spcPct val="90000"/>
+              </a:lnSpc>
+              <a:spcBef>
+                <a:spcPts val="500"/>
+              </a:spcBef>
+              <a:buFont typeface="Arial" panose="020B0604020202020204" pitchFamily="34" charset="0"/>
+              <a:buChar char="•"/>
+              <a:defRPr sz="1800" kern="1200">
+                <a:solidFill>
+                  <a:schemeClr val="tx1"/>
+                </a:solidFill>
+                <a:latin typeface="+mn-lt"/>
+                <a:ea typeface="+mn-ea"/>
+                <a:cs typeface="+mn-cs"/>
+              </a:defRPr>
+            </a:lvl7pPr>
+            <a:lvl8pPr marL="3429000" indent="-228600" algn="l" defTabSz="914400" rtl="0" eaLnBrk="1" latinLnBrk="0" hangingPunct="1">
+              <a:lnSpc>
+                <a:spcPct val="90000"/>
+              </a:lnSpc>
+              <a:spcBef>
+                <a:spcPts val="500"/>
+              </a:spcBef>
+              <a:buFont typeface="Arial" panose="020B0604020202020204" pitchFamily="34" charset="0"/>
+              <a:buChar char="•"/>
+              <a:defRPr sz="1800" kern="1200">
+                <a:solidFill>
+                  <a:schemeClr val="tx1"/>
+                </a:solidFill>
+                <a:latin typeface="+mn-lt"/>
+                <a:ea typeface="+mn-ea"/>
+                <a:cs typeface="+mn-cs"/>
+              </a:defRPr>
+            </a:lvl8pPr>
+            <a:lvl9pPr marL="3886200" indent="-228600" algn="l" defTabSz="914400" rtl="0" eaLnBrk="1" latinLnBrk="0" hangingPunct="1">
+              <a:lnSpc>
+                <a:spcPct val="90000"/>
+              </a:lnSpc>
+              <a:spcBef>
+                <a:spcPts val="500"/>
+              </a:spcBef>
+              <a:buFont typeface="Arial" panose="020B0604020202020204" pitchFamily="34" charset="0"/>
+              <a:buChar char="•"/>
+              <a:defRPr sz="1800" kern="1200">
+                <a:solidFill>
+                  <a:schemeClr val="tx1"/>
+                </a:solidFill>
+                <a:latin typeface="+mn-lt"/>
+                <a:ea typeface="+mn-ea"/>
+                <a:cs typeface="+mn-cs"/>
+              </a:defRPr>
+            </a:lvl9pPr>
+          </a:lstStyle>
+          <a:p>
+            <a:pPr>
+              <a:lnSpc>
+                <a:spcPct val="100000"/>
+              </a:lnSpc>
+            </a:pPr>
+            <a:r>
+              <a:rPr lang="en-US"/>
+              <a:t>Financial Feasibility</a:t>
+            </a:r>
+          </a:p>
+        </p:txBody>
+      </p:sp>
+      <p:sp>
+        <p:nvSpPr>
+          <p:cNvPr id="23" name="Text Placeholder 8"/>
+          <p:cNvSpPr txBox="1">
+            <a:spLocks/>
+          </p:cNvSpPr>
+          <p:nvPr/>
+        </p:nvSpPr>
+        <p:spPr>
+          <a:xfrm>
+            <a:off x="604738" y="3552066"/>
+            <a:ext cx="5201702" cy="268656"/>
+          </a:xfrm>
+          <a:prstGeom prst="rect">
+            <a:avLst/>
+          </a:prstGeom>
+        </p:spPr>
+        <p:txBody>
+          <a:bodyPr vert="horz" wrap="none" lIns="0" tIns="0" rIns="0" bIns="0" rtlCol="0">
+            <a:normAutofit/>
+          </a:bodyPr>
+          <a:lstStyle>
+            <a:lvl1pPr marL="0" indent="0" algn="l" defTabSz="914400" rtl="0" eaLnBrk="1" latinLnBrk="0" hangingPunct="1">
+              <a:lnSpc>
+                <a:spcPct val="90000"/>
+              </a:lnSpc>
+              <a:spcBef>
+                <a:spcPts val="1000"/>
+              </a:spcBef>
+              <a:buFont typeface="Arial" panose="020B0604020202020204" pitchFamily="34" charset="0"/>
+              <a:buNone/>
+              <a:defRPr lang="en-IN" sz="1400" kern="1200" dirty="0">
+                <a:solidFill>
+                  <a:schemeClr val="accent4">
+                    <a:lumMod val="75000"/>
+                    <a:lumOff val="25000"/>
+                  </a:schemeClr>
+                </a:solidFill>
+                <a:latin typeface="Segoe UI" panose="020B0502040204020203" pitchFamily="34" charset="0"/>
+                <a:ea typeface="+mn-ea"/>
+                <a:cs typeface="+mn-cs"/>
+              </a:defRPr>
+            </a:lvl1pPr>
+            <a:lvl2pPr marL="457200" indent="0" algn="l" defTabSz="914400" rtl="0" eaLnBrk="1" latinLnBrk="0" hangingPunct="1">
+              <a:lnSpc>
+                <a:spcPct val="90000"/>
+              </a:lnSpc>
+              <a:spcBef>
+                <a:spcPts val="500"/>
+              </a:spcBef>
+              <a:buFont typeface="Arial" panose="020B0604020202020204" pitchFamily="34" charset="0"/>
+              <a:buNone/>
+              <a:defRPr sz="1850" kern="1200">
+                <a:solidFill>
+                  <a:schemeClr val="accent4">
+                    <a:lumMod val="75000"/>
+                    <a:lumOff val="25000"/>
+                  </a:schemeClr>
+                </a:solidFill>
+                <a:latin typeface="+mj-lt"/>
+                <a:ea typeface="+mn-ea"/>
+                <a:cs typeface="+mn-cs"/>
+              </a:defRPr>
+            </a:lvl2pPr>
+            <a:lvl3pPr marL="914400" indent="0" algn="l" defTabSz="914400" rtl="0" eaLnBrk="1" latinLnBrk="0" hangingPunct="1">
+              <a:lnSpc>
+                <a:spcPct val="90000"/>
+              </a:lnSpc>
+              <a:spcBef>
+                <a:spcPts val="500"/>
+              </a:spcBef>
+              <a:buFont typeface="Arial" panose="020B0604020202020204" pitchFamily="34" charset="0"/>
+              <a:buNone/>
+              <a:defRPr sz="1850" kern="1200">
+                <a:solidFill>
+                  <a:schemeClr val="accent4">
+                    <a:lumMod val="75000"/>
+                    <a:lumOff val="25000"/>
+                  </a:schemeClr>
+                </a:solidFill>
+                <a:latin typeface="+mj-lt"/>
+                <a:ea typeface="+mn-ea"/>
+                <a:cs typeface="+mn-cs"/>
+              </a:defRPr>
+            </a:lvl3pPr>
+            <a:lvl4pPr marL="1371600" indent="0" algn="l" defTabSz="914400" rtl="0" eaLnBrk="1" latinLnBrk="0" hangingPunct="1">
+              <a:lnSpc>
+                <a:spcPct val="90000"/>
+              </a:lnSpc>
+              <a:spcBef>
+                <a:spcPts val="500"/>
+              </a:spcBef>
+              <a:buFont typeface="Arial" panose="020B0604020202020204" pitchFamily="34" charset="0"/>
+              <a:buNone/>
+              <a:defRPr sz="1850" kern="1200">
+                <a:solidFill>
+                  <a:schemeClr val="accent4">
+                    <a:lumMod val="75000"/>
+                    <a:lumOff val="25000"/>
+                  </a:schemeClr>
+                </a:solidFill>
+                <a:latin typeface="+mj-lt"/>
+                <a:ea typeface="+mn-ea"/>
+                <a:cs typeface="+mn-cs"/>
+              </a:defRPr>
+            </a:lvl4pPr>
+            <a:lvl5pPr marL="1828800" indent="0" algn="l" defTabSz="914400" rtl="0" eaLnBrk="1" latinLnBrk="0" hangingPunct="1">
+              <a:lnSpc>
+                <a:spcPct val="90000"/>
+              </a:lnSpc>
+              <a:spcBef>
+                <a:spcPts val="500"/>
+              </a:spcBef>
+              <a:buFont typeface="Arial" panose="020B0604020202020204" pitchFamily="34" charset="0"/>
+              <a:buNone/>
+              <a:defRPr sz="1850" kern="1200">
+                <a:solidFill>
+                  <a:schemeClr val="accent4">
+                    <a:lumMod val="75000"/>
+                    <a:lumOff val="25000"/>
+                  </a:schemeClr>
+                </a:solidFill>
+                <a:latin typeface="+mj-lt"/>
+                <a:ea typeface="+mn-ea"/>
+                <a:cs typeface="+mn-cs"/>
+              </a:defRPr>
+            </a:lvl5pPr>
+            <a:lvl6pPr marL="2514600" indent="-228600" algn="l" defTabSz="914400" rtl="0" eaLnBrk="1" latinLnBrk="0" hangingPunct="1">
+              <a:lnSpc>
+                <a:spcPct val="90000"/>
+              </a:lnSpc>
+              <a:spcBef>
+                <a:spcPts val="500"/>
+              </a:spcBef>
+              <a:buFont typeface="Arial" panose="020B0604020202020204" pitchFamily="34" charset="0"/>
+              <a:buChar char="•"/>
+              <a:defRPr sz="1800" kern="1200">
+                <a:solidFill>
+                  <a:schemeClr val="tx1"/>
+                </a:solidFill>
+                <a:latin typeface="+mn-lt"/>
+                <a:ea typeface="+mn-ea"/>
+                <a:cs typeface="+mn-cs"/>
+              </a:defRPr>
+            </a:lvl6pPr>
+            <a:lvl7pPr marL="2971800" indent="-228600" algn="l" defTabSz="914400" rtl="0" eaLnBrk="1" latinLnBrk="0" hangingPunct="1">
+              <a:lnSpc>
+                <a:spcPct val="90000"/>
+              </a:lnSpc>
+              <a:spcBef>
+                <a:spcPts val="500"/>
+              </a:spcBef>
+              <a:buFont typeface="Arial" panose="020B0604020202020204" pitchFamily="34" charset="0"/>
+              <a:buChar char="•"/>
+              <a:defRPr sz="1800" kern="1200">
+                <a:solidFill>
+                  <a:schemeClr val="tx1"/>
+                </a:solidFill>
+                <a:latin typeface="+mn-lt"/>
+                <a:ea typeface="+mn-ea"/>
+                <a:cs typeface="+mn-cs"/>
+              </a:defRPr>
+            </a:lvl7pPr>
+            <a:lvl8pPr marL="3429000" indent="-228600" algn="l" defTabSz="914400" rtl="0" eaLnBrk="1" latinLnBrk="0" hangingPunct="1">
+              <a:lnSpc>
+                <a:spcPct val="90000"/>
+              </a:lnSpc>
+              <a:spcBef>
+                <a:spcPts val="500"/>
+              </a:spcBef>
+              <a:buFont typeface="Arial" panose="020B0604020202020204" pitchFamily="34" charset="0"/>
+              <a:buChar char="•"/>
+              <a:defRPr sz="1800" kern="1200">
+                <a:solidFill>
+                  <a:schemeClr val="tx1"/>
+                </a:solidFill>
+                <a:latin typeface="+mn-lt"/>
+                <a:ea typeface="+mn-ea"/>
+                <a:cs typeface="+mn-cs"/>
+              </a:defRPr>
+            </a:lvl8pPr>
+            <a:lvl9pPr marL="3886200" indent="-228600" algn="l" defTabSz="914400" rtl="0" eaLnBrk="1" latinLnBrk="0" hangingPunct="1">
+              <a:lnSpc>
+                <a:spcPct val="90000"/>
+              </a:lnSpc>
+              <a:spcBef>
+                <a:spcPts val="500"/>
+              </a:spcBef>
+              <a:buFont typeface="Arial" panose="020B0604020202020204" pitchFamily="34" charset="0"/>
+              <a:buChar char="•"/>
+              <a:defRPr sz="1800" kern="1200">
+                <a:solidFill>
+                  <a:schemeClr val="tx1"/>
+                </a:solidFill>
+                <a:latin typeface="+mn-lt"/>
+                <a:ea typeface="+mn-ea"/>
+                <a:cs typeface="+mn-cs"/>
+              </a:defRPr>
+            </a:lvl9pPr>
+          </a:lstStyle>
+          <a:p>
+            <a:pPr>
+              <a:lnSpc>
+                <a:spcPct val="100000"/>
+              </a:lnSpc>
+            </a:pPr>
+            <a:r>
+              <a:rPr lang="en-US"/>
+              <a:t>What makes your solution/idea innovative?</a:t>
+            </a:r>
+          </a:p>
+        </p:txBody>
+      </p:sp>
+      <p:sp>
+        <p:nvSpPr>
+          <p:cNvPr id="24" name="Text Placeholder 8"/>
+          <p:cNvSpPr txBox="1">
+            <a:spLocks/>
+          </p:cNvSpPr>
+          <p:nvPr/>
+        </p:nvSpPr>
+        <p:spPr>
+          <a:xfrm>
+            <a:off x="604738" y="5181462"/>
+            <a:ext cx="5201702" cy="268656"/>
+          </a:xfrm>
+          <a:prstGeom prst="rect">
+            <a:avLst/>
+          </a:prstGeom>
+        </p:spPr>
+        <p:txBody>
+          <a:bodyPr vert="horz" wrap="none" lIns="0" tIns="0" rIns="0" bIns="0" rtlCol="0">
+            <a:normAutofit/>
+          </a:bodyPr>
+          <a:lstStyle>
+            <a:lvl1pPr marL="0" indent="0" algn="l" defTabSz="914400" rtl="0" eaLnBrk="1" latinLnBrk="0" hangingPunct="1">
+              <a:lnSpc>
+                <a:spcPct val="90000"/>
+              </a:lnSpc>
+              <a:spcBef>
+                <a:spcPts val="1000"/>
+              </a:spcBef>
+              <a:buFont typeface="Arial" panose="020B0604020202020204" pitchFamily="34" charset="0"/>
+              <a:buNone/>
+              <a:defRPr lang="en-IN" sz="1400" kern="1200" dirty="0">
+                <a:solidFill>
+                  <a:schemeClr val="accent4">
+                    <a:lumMod val="75000"/>
+                    <a:lumOff val="25000"/>
+                  </a:schemeClr>
+                </a:solidFill>
+                <a:latin typeface="Segoe UI" panose="020B0502040204020203" pitchFamily="34" charset="0"/>
+                <a:ea typeface="+mn-ea"/>
+                <a:cs typeface="+mn-cs"/>
+              </a:defRPr>
+            </a:lvl1pPr>
+            <a:lvl2pPr marL="457200" indent="0" algn="l" defTabSz="914400" rtl="0" eaLnBrk="1" latinLnBrk="0" hangingPunct="1">
+              <a:lnSpc>
+                <a:spcPct val="90000"/>
+              </a:lnSpc>
+              <a:spcBef>
+                <a:spcPts val="500"/>
+              </a:spcBef>
+              <a:buFont typeface="Arial" panose="020B0604020202020204" pitchFamily="34" charset="0"/>
+              <a:buNone/>
+              <a:defRPr sz="1850" kern="1200">
+                <a:solidFill>
+                  <a:schemeClr val="accent4">
+                    <a:lumMod val="75000"/>
+                    <a:lumOff val="25000"/>
+                  </a:schemeClr>
+                </a:solidFill>
+                <a:latin typeface="+mj-lt"/>
+                <a:ea typeface="+mn-ea"/>
+                <a:cs typeface="+mn-cs"/>
+              </a:defRPr>
+            </a:lvl2pPr>
+            <a:lvl3pPr marL="914400" indent="0" algn="l" defTabSz="914400" rtl="0" eaLnBrk="1" latinLnBrk="0" hangingPunct="1">
+              <a:lnSpc>
+                <a:spcPct val="90000"/>
+              </a:lnSpc>
+              <a:spcBef>
+                <a:spcPts val="500"/>
+              </a:spcBef>
+              <a:buFont typeface="Arial" panose="020B0604020202020204" pitchFamily="34" charset="0"/>
+              <a:buNone/>
+              <a:defRPr sz="1850" kern="1200">
+                <a:solidFill>
+                  <a:schemeClr val="accent4">
+                    <a:lumMod val="75000"/>
+                    <a:lumOff val="25000"/>
+                  </a:schemeClr>
+                </a:solidFill>
+                <a:latin typeface="+mj-lt"/>
+                <a:ea typeface="+mn-ea"/>
+                <a:cs typeface="+mn-cs"/>
+              </a:defRPr>
+            </a:lvl3pPr>
+            <a:lvl4pPr marL="1371600" indent="0" algn="l" defTabSz="914400" rtl="0" eaLnBrk="1" latinLnBrk="0" hangingPunct="1">
+              <a:lnSpc>
+                <a:spcPct val="90000"/>
+              </a:lnSpc>
+              <a:spcBef>
+                <a:spcPts val="500"/>
+              </a:spcBef>
+              <a:buFont typeface="Arial" panose="020B0604020202020204" pitchFamily="34" charset="0"/>
+              <a:buNone/>
+              <a:defRPr sz="1850" kern="1200">
+                <a:solidFill>
+                  <a:schemeClr val="accent4">
+                    <a:lumMod val="75000"/>
+                    <a:lumOff val="25000"/>
+                  </a:schemeClr>
+                </a:solidFill>
+                <a:latin typeface="+mj-lt"/>
+                <a:ea typeface="+mn-ea"/>
+                <a:cs typeface="+mn-cs"/>
+              </a:defRPr>
+            </a:lvl4pPr>
+            <a:lvl5pPr marL="1828800" indent="0" algn="l" defTabSz="914400" rtl="0" eaLnBrk="1" latinLnBrk="0" hangingPunct="1">
+              <a:lnSpc>
+                <a:spcPct val="90000"/>
+              </a:lnSpc>
+              <a:spcBef>
+                <a:spcPts val="500"/>
+              </a:spcBef>
+              <a:buFont typeface="Arial" panose="020B0604020202020204" pitchFamily="34" charset="0"/>
+              <a:buNone/>
+              <a:defRPr sz="1850" kern="1200">
+                <a:solidFill>
+                  <a:schemeClr val="accent4">
+                    <a:lumMod val="75000"/>
+                    <a:lumOff val="25000"/>
+                  </a:schemeClr>
+                </a:solidFill>
+                <a:latin typeface="+mj-lt"/>
+                <a:ea typeface="+mn-ea"/>
+                <a:cs typeface="+mn-cs"/>
+              </a:defRPr>
+            </a:lvl5pPr>
+            <a:lvl6pPr marL="2514600" indent="-228600" algn="l" defTabSz="914400" rtl="0" eaLnBrk="1" latinLnBrk="0" hangingPunct="1">
+              <a:lnSpc>
+                <a:spcPct val="90000"/>
+              </a:lnSpc>
+              <a:spcBef>
+                <a:spcPts val="500"/>
+              </a:spcBef>
+              <a:buFont typeface="Arial" panose="020B0604020202020204" pitchFamily="34" charset="0"/>
+              <a:buChar char="•"/>
+              <a:defRPr sz="1800" kern="1200">
+                <a:solidFill>
+                  <a:schemeClr val="tx1"/>
+                </a:solidFill>
+                <a:latin typeface="+mn-lt"/>
+                <a:ea typeface="+mn-ea"/>
+                <a:cs typeface="+mn-cs"/>
+              </a:defRPr>
+            </a:lvl6pPr>
+            <a:lvl7pPr marL="2971800" indent="-228600" algn="l" defTabSz="914400" rtl="0" eaLnBrk="1" latinLnBrk="0" hangingPunct="1">
+              <a:lnSpc>
+                <a:spcPct val="90000"/>
+              </a:lnSpc>
+              <a:spcBef>
+                <a:spcPts val="500"/>
+              </a:spcBef>
+              <a:buFont typeface="Arial" panose="020B0604020202020204" pitchFamily="34" charset="0"/>
+              <a:buChar char="•"/>
+              <a:defRPr sz="1800" kern="1200">
+                <a:solidFill>
+                  <a:schemeClr val="tx1"/>
+                </a:solidFill>
+                <a:latin typeface="+mn-lt"/>
+                <a:ea typeface="+mn-ea"/>
+                <a:cs typeface="+mn-cs"/>
+              </a:defRPr>
+            </a:lvl7pPr>
+            <a:lvl8pPr marL="3429000" indent="-228600" algn="l" defTabSz="914400" rtl="0" eaLnBrk="1" latinLnBrk="0" hangingPunct="1">
+              <a:lnSpc>
+                <a:spcPct val="90000"/>
+              </a:lnSpc>
+              <a:spcBef>
+                <a:spcPts val="500"/>
+              </a:spcBef>
+              <a:buFont typeface="Arial" panose="020B0604020202020204" pitchFamily="34" charset="0"/>
+              <a:buChar char="•"/>
+              <a:defRPr sz="1800" kern="1200">
+                <a:solidFill>
+                  <a:schemeClr val="tx1"/>
+                </a:solidFill>
+                <a:latin typeface="+mn-lt"/>
+                <a:ea typeface="+mn-ea"/>
+                <a:cs typeface="+mn-cs"/>
+              </a:defRPr>
+            </a:lvl8pPr>
+            <a:lvl9pPr marL="3886200" indent="-228600" algn="l" defTabSz="914400" rtl="0" eaLnBrk="1" latinLnBrk="0" hangingPunct="1">
+              <a:lnSpc>
+                <a:spcPct val="90000"/>
+              </a:lnSpc>
+              <a:spcBef>
+                <a:spcPts val="500"/>
+              </a:spcBef>
+              <a:buFont typeface="Arial" panose="020B0604020202020204" pitchFamily="34" charset="0"/>
+              <a:buChar char="•"/>
+              <a:defRPr sz="1800" kern="1200">
+                <a:solidFill>
+                  <a:schemeClr val="tx1"/>
+                </a:solidFill>
+                <a:latin typeface="+mn-lt"/>
+                <a:ea typeface="+mn-ea"/>
+                <a:cs typeface="+mn-cs"/>
+              </a:defRPr>
+            </a:lvl9pPr>
+          </a:lstStyle>
+          <a:p>
+            <a:pPr>
+              <a:lnSpc>
+                <a:spcPct val="100000"/>
+              </a:lnSpc>
+            </a:pPr>
+            <a:r>
+              <a:rPr lang="en-US"/>
+              <a:t>Testimony</a:t>
+            </a:r>
+          </a:p>
+        </p:txBody>
+      </p:sp>
+      <p:sp>
+        <p:nvSpPr>
+          <p:cNvPr id="25" name="Text Placeholder 8"/>
+          <p:cNvSpPr txBox="1">
+            <a:spLocks/>
+          </p:cNvSpPr>
+          <p:nvPr/>
+        </p:nvSpPr>
+        <p:spPr>
+          <a:xfrm>
+            <a:off x="604738" y="5524119"/>
+            <a:ext cx="5201702" cy="268656"/>
+          </a:xfrm>
+          <a:prstGeom prst="rect">
+            <a:avLst/>
+          </a:prstGeom>
+        </p:spPr>
+        <p:txBody>
+          <a:bodyPr vert="horz" wrap="none" lIns="0" tIns="0" rIns="0" bIns="0" rtlCol="0">
+            <a:normAutofit/>
+          </a:bodyPr>
+          <a:lstStyle>
+            <a:lvl1pPr marL="0" indent="0" algn="l" defTabSz="914400" rtl="0" eaLnBrk="1" latinLnBrk="0" hangingPunct="1">
+              <a:lnSpc>
+                <a:spcPct val="90000"/>
+              </a:lnSpc>
+              <a:spcBef>
+                <a:spcPts val="1000"/>
+              </a:spcBef>
+              <a:buFont typeface="Arial" panose="020B0604020202020204" pitchFamily="34" charset="0"/>
+              <a:buNone/>
+              <a:defRPr lang="en-IN" sz="1400" kern="1200" dirty="0">
+                <a:solidFill>
+                  <a:schemeClr val="accent4">
+                    <a:lumMod val="75000"/>
+                    <a:lumOff val="25000"/>
+                  </a:schemeClr>
+                </a:solidFill>
+                <a:latin typeface="Segoe UI" panose="020B0502040204020203" pitchFamily="34" charset="0"/>
+                <a:ea typeface="+mn-ea"/>
+                <a:cs typeface="+mn-cs"/>
+              </a:defRPr>
+            </a:lvl1pPr>
+            <a:lvl2pPr marL="457200" indent="0" algn="l" defTabSz="914400" rtl="0" eaLnBrk="1" latinLnBrk="0" hangingPunct="1">
+              <a:lnSpc>
+                <a:spcPct val="90000"/>
+              </a:lnSpc>
+              <a:spcBef>
+                <a:spcPts val="500"/>
+              </a:spcBef>
+              <a:buFont typeface="Arial" panose="020B0604020202020204" pitchFamily="34" charset="0"/>
+              <a:buNone/>
+              <a:defRPr sz="1850" kern="1200">
+                <a:solidFill>
+                  <a:schemeClr val="accent4">
+                    <a:lumMod val="75000"/>
+                    <a:lumOff val="25000"/>
+                  </a:schemeClr>
+                </a:solidFill>
+                <a:latin typeface="+mj-lt"/>
+                <a:ea typeface="+mn-ea"/>
+                <a:cs typeface="+mn-cs"/>
+              </a:defRPr>
+            </a:lvl2pPr>
+            <a:lvl3pPr marL="914400" indent="0" algn="l" defTabSz="914400" rtl="0" eaLnBrk="1" latinLnBrk="0" hangingPunct="1">
+              <a:lnSpc>
+                <a:spcPct val="90000"/>
+              </a:lnSpc>
+              <a:spcBef>
+                <a:spcPts val="500"/>
+              </a:spcBef>
+              <a:buFont typeface="Arial" panose="020B0604020202020204" pitchFamily="34" charset="0"/>
+              <a:buNone/>
+              <a:defRPr sz="1850" kern="1200">
+                <a:solidFill>
+                  <a:schemeClr val="accent4">
+                    <a:lumMod val="75000"/>
+                    <a:lumOff val="25000"/>
+                  </a:schemeClr>
+                </a:solidFill>
+                <a:latin typeface="+mj-lt"/>
+                <a:ea typeface="+mn-ea"/>
+                <a:cs typeface="+mn-cs"/>
+              </a:defRPr>
+            </a:lvl3pPr>
+            <a:lvl4pPr marL="1371600" indent="0" algn="l" defTabSz="914400" rtl="0" eaLnBrk="1" latinLnBrk="0" hangingPunct="1">
+              <a:lnSpc>
+                <a:spcPct val="90000"/>
+              </a:lnSpc>
+              <a:spcBef>
+                <a:spcPts val="500"/>
+              </a:spcBef>
+              <a:buFont typeface="Arial" panose="020B0604020202020204" pitchFamily="34" charset="0"/>
+              <a:buNone/>
+              <a:defRPr sz="1850" kern="1200">
+                <a:solidFill>
+                  <a:schemeClr val="accent4">
+                    <a:lumMod val="75000"/>
+                    <a:lumOff val="25000"/>
+                  </a:schemeClr>
+                </a:solidFill>
+                <a:latin typeface="+mj-lt"/>
+                <a:ea typeface="+mn-ea"/>
+                <a:cs typeface="+mn-cs"/>
+              </a:defRPr>
+            </a:lvl4pPr>
+            <a:lvl5pPr marL="1828800" indent="0" algn="l" defTabSz="914400" rtl="0" eaLnBrk="1" latinLnBrk="0" hangingPunct="1">
+              <a:lnSpc>
+                <a:spcPct val="90000"/>
+              </a:lnSpc>
+              <a:spcBef>
+                <a:spcPts val="500"/>
+              </a:spcBef>
+              <a:buFont typeface="Arial" panose="020B0604020202020204" pitchFamily="34" charset="0"/>
+              <a:buNone/>
+              <a:defRPr sz="1850" kern="1200">
+                <a:solidFill>
+                  <a:schemeClr val="accent4">
+                    <a:lumMod val="75000"/>
+                    <a:lumOff val="25000"/>
+                  </a:schemeClr>
+                </a:solidFill>
+                <a:latin typeface="+mj-lt"/>
+                <a:ea typeface="+mn-ea"/>
+                <a:cs typeface="+mn-cs"/>
+              </a:defRPr>
+            </a:lvl5pPr>
+            <a:lvl6pPr marL="2514600" indent="-228600" algn="l" defTabSz="914400" rtl="0" eaLnBrk="1" latinLnBrk="0" hangingPunct="1">
+              <a:lnSpc>
+                <a:spcPct val="90000"/>
+              </a:lnSpc>
+              <a:spcBef>
+                <a:spcPts val="500"/>
+              </a:spcBef>
+              <a:buFont typeface="Arial" panose="020B0604020202020204" pitchFamily="34" charset="0"/>
+              <a:buChar char="•"/>
+              <a:defRPr sz="1800" kern="1200">
+                <a:solidFill>
+                  <a:schemeClr val="tx1"/>
+                </a:solidFill>
+                <a:latin typeface="+mn-lt"/>
+                <a:ea typeface="+mn-ea"/>
+                <a:cs typeface="+mn-cs"/>
+              </a:defRPr>
+            </a:lvl6pPr>
+            <a:lvl7pPr marL="2971800" indent="-228600" algn="l" defTabSz="914400" rtl="0" eaLnBrk="1" latinLnBrk="0" hangingPunct="1">
+              <a:lnSpc>
+                <a:spcPct val="90000"/>
+              </a:lnSpc>
+              <a:spcBef>
+                <a:spcPts val="500"/>
+              </a:spcBef>
+              <a:buFont typeface="Arial" panose="020B0604020202020204" pitchFamily="34" charset="0"/>
+              <a:buChar char="•"/>
+              <a:defRPr sz="1800" kern="1200">
+                <a:solidFill>
+                  <a:schemeClr val="tx1"/>
+                </a:solidFill>
+                <a:latin typeface="+mn-lt"/>
+                <a:ea typeface="+mn-ea"/>
+                <a:cs typeface="+mn-cs"/>
+              </a:defRPr>
+            </a:lvl7pPr>
+            <a:lvl8pPr marL="3429000" indent="-228600" algn="l" defTabSz="914400" rtl="0" eaLnBrk="1" latinLnBrk="0" hangingPunct="1">
+              <a:lnSpc>
+                <a:spcPct val="90000"/>
+              </a:lnSpc>
+              <a:spcBef>
+                <a:spcPts val="500"/>
+              </a:spcBef>
+              <a:buFont typeface="Arial" panose="020B0604020202020204" pitchFamily="34" charset="0"/>
+              <a:buChar char="•"/>
+              <a:defRPr sz="1800" kern="1200">
+                <a:solidFill>
+                  <a:schemeClr val="tx1"/>
+                </a:solidFill>
+                <a:latin typeface="+mn-lt"/>
+                <a:ea typeface="+mn-ea"/>
+                <a:cs typeface="+mn-cs"/>
+              </a:defRPr>
+            </a:lvl8pPr>
+            <a:lvl9pPr marL="3886200" indent="-228600" algn="l" defTabSz="914400" rtl="0" eaLnBrk="1" latinLnBrk="0" hangingPunct="1">
+              <a:lnSpc>
+                <a:spcPct val="90000"/>
+              </a:lnSpc>
+              <a:spcBef>
+                <a:spcPts val="500"/>
+              </a:spcBef>
+              <a:buFont typeface="Arial" panose="020B0604020202020204" pitchFamily="34" charset="0"/>
+              <a:buChar char="•"/>
+              <a:defRPr sz="1800" kern="1200">
+                <a:solidFill>
+                  <a:schemeClr val="tx1"/>
+                </a:solidFill>
+                <a:latin typeface="+mn-lt"/>
+                <a:ea typeface="+mn-ea"/>
+                <a:cs typeface="+mn-cs"/>
+              </a:defRPr>
+            </a:lvl9pPr>
+          </a:lstStyle>
+          <a:p>
+            <a:pPr>
+              <a:lnSpc>
+                <a:spcPct val="100000"/>
+              </a:lnSpc>
+            </a:pPr>
+            <a:r>
+              <a:rPr lang="en-US"/>
+              <a:t>Elevator Pitch – 1 to 2 </a:t>
+            </a:r>
+            <a:r>
+              <a:rPr lang="en-US" err="1"/>
+              <a:t>mins</a:t>
+            </a:r>
+            <a:endParaRPr lang="en-US"/>
+          </a:p>
+        </p:txBody>
+      </p:sp>
+      <p:sp>
+        <p:nvSpPr>
+          <p:cNvPr id="26" name="Text Placeholder 8">
+            <a:extLst>
+              <a:ext uri="{FF2B5EF4-FFF2-40B4-BE49-F238E27FC236}">
+                <a16:creationId xmlns:a16="http://schemas.microsoft.com/office/drawing/2014/main" id="{B491FE36-B858-40D3-95B7-4DD516AF82E4}"/>
+              </a:ext>
+            </a:extLst>
+          </p:cNvPr>
+          <p:cNvSpPr txBox="1">
+            <a:spLocks/>
+          </p:cNvSpPr>
+          <p:nvPr/>
+        </p:nvSpPr>
+        <p:spPr>
+          <a:xfrm>
+            <a:off x="604738" y="3960439"/>
+            <a:ext cx="5201702" cy="268656"/>
+          </a:xfrm>
+          <a:prstGeom prst="rect">
+            <a:avLst/>
+          </a:prstGeom>
+        </p:spPr>
+        <p:txBody>
+          <a:bodyPr vert="horz" wrap="none" lIns="0" tIns="0" rIns="0" bIns="0" rtlCol="0">
+            <a:normAutofit/>
+          </a:bodyPr>
+          <a:lstStyle>
+            <a:lvl1pPr marL="0" indent="0" algn="l" defTabSz="914400" rtl="0" eaLnBrk="1" latinLnBrk="0" hangingPunct="1">
+              <a:lnSpc>
+                <a:spcPct val="90000"/>
+              </a:lnSpc>
+              <a:spcBef>
+                <a:spcPts val="1000"/>
+              </a:spcBef>
+              <a:buFont typeface="Arial" panose="020B0604020202020204" pitchFamily="34" charset="0"/>
+              <a:buNone/>
+              <a:defRPr lang="en-IN" sz="1400" kern="1200" dirty="0">
+                <a:solidFill>
+                  <a:schemeClr val="accent4">
+                    <a:lumMod val="75000"/>
+                    <a:lumOff val="25000"/>
+                  </a:schemeClr>
+                </a:solidFill>
+                <a:latin typeface="Segoe UI" panose="020B0502040204020203" pitchFamily="34" charset="0"/>
+                <a:ea typeface="+mn-ea"/>
+                <a:cs typeface="+mn-cs"/>
+              </a:defRPr>
+            </a:lvl1pPr>
+            <a:lvl2pPr marL="457200" indent="0" algn="l" defTabSz="914400" rtl="0" eaLnBrk="1" latinLnBrk="0" hangingPunct="1">
+              <a:lnSpc>
+                <a:spcPct val="90000"/>
+              </a:lnSpc>
+              <a:spcBef>
+                <a:spcPts val="500"/>
+              </a:spcBef>
+              <a:buFont typeface="Arial" panose="020B0604020202020204" pitchFamily="34" charset="0"/>
+              <a:buNone/>
+              <a:defRPr sz="1850" kern="1200">
+                <a:solidFill>
+                  <a:schemeClr val="accent4">
+                    <a:lumMod val="75000"/>
+                    <a:lumOff val="25000"/>
+                  </a:schemeClr>
+                </a:solidFill>
+                <a:latin typeface="+mj-lt"/>
+                <a:ea typeface="+mn-ea"/>
+                <a:cs typeface="+mn-cs"/>
+              </a:defRPr>
+            </a:lvl2pPr>
+            <a:lvl3pPr marL="914400" indent="0" algn="l" defTabSz="914400" rtl="0" eaLnBrk="1" latinLnBrk="0" hangingPunct="1">
+              <a:lnSpc>
+                <a:spcPct val="90000"/>
+              </a:lnSpc>
+              <a:spcBef>
+                <a:spcPts val="500"/>
+              </a:spcBef>
+              <a:buFont typeface="Arial" panose="020B0604020202020204" pitchFamily="34" charset="0"/>
+              <a:buNone/>
+              <a:defRPr sz="1850" kern="1200">
+                <a:solidFill>
+                  <a:schemeClr val="accent4">
+                    <a:lumMod val="75000"/>
+                    <a:lumOff val="25000"/>
+                  </a:schemeClr>
+                </a:solidFill>
+                <a:latin typeface="+mj-lt"/>
+                <a:ea typeface="+mn-ea"/>
+                <a:cs typeface="+mn-cs"/>
+              </a:defRPr>
+            </a:lvl3pPr>
+            <a:lvl4pPr marL="1371600" indent="0" algn="l" defTabSz="914400" rtl="0" eaLnBrk="1" latinLnBrk="0" hangingPunct="1">
+              <a:lnSpc>
+                <a:spcPct val="90000"/>
+              </a:lnSpc>
+              <a:spcBef>
+                <a:spcPts val="500"/>
+              </a:spcBef>
+              <a:buFont typeface="Arial" panose="020B0604020202020204" pitchFamily="34" charset="0"/>
+              <a:buNone/>
+              <a:defRPr sz="1850" kern="1200">
+                <a:solidFill>
+                  <a:schemeClr val="accent4">
+                    <a:lumMod val="75000"/>
+                    <a:lumOff val="25000"/>
+                  </a:schemeClr>
+                </a:solidFill>
+                <a:latin typeface="+mj-lt"/>
+                <a:ea typeface="+mn-ea"/>
+                <a:cs typeface="+mn-cs"/>
+              </a:defRPr>
+            </a:lvl4pPr>
+            <a:lvl5pPr marL="1828800" indent="0" algn="l" defTabSz="914400" rtl="0" eaLnBrk="1" latinLnBrk="0" hangingPunct="1">
+              <a:lnSpc>
+                <a:spcPct val="90000"/>
+              </a:lnSpc>
+              <a:spcBef>
+                <a:spcPts val="500"/>
+              </a:spcBef>
+              <a:buFont typeface="Arial" panose="020B0604020202020204" pitchFamily="34" charset="0"/>
+              <a:buNone/>
+              <a:defRPr sz="1850" kern="1200">
+                <a:solidFill>
+                  <a:schemeClr val="accent4">
+                    <a:lumMod val="75000"/>
+                    <a:lumOff val="25000"/>
+                  </a:schemeClr>
+                </a:solidFill>
+                <a:latin typeface="+mj-lt"/>
+                <a:ea typeface="+mn-ea"/>
+                <a:cs typeface="+mn-cs"/>
+              </a:defRPr>
+            </a:lvl5pPr>
+            <a:lvl6pPr marL="2514600" indent="-228600" algn="l" defTabSz="914400" rtl="0" eaLnBrk="1" latinLnBrk="0" hangingPunct="1">
+              <a:lnSpc>
+                <a:spcPct val="90000"/>
+              </a:lnSpc>
+              <a:spcBef>
+                <a:spcPts val="500"/>
+              </a:spcBef>
+              <a:buFont typeface="Arial" panose="020B0604020202020204" pitchFamily="34" charset="0"/>
+              <a:buChar char="•"/>
+              <a:defRPr sz="1800" kern="1200">
+                <a:solidFill>
+                  <a:schemeClr val="tx1"/>
+                </a:solidFill>
+                <a:latin typeface="+mn-lt"/>
+                <a:ea typeface="+mn-ea"/>
+                <a:cs typeface="+mn-cs"/>
+              </a:defRPr>
+            </a:lvl6pPr>
+            <a:lvl7pPr marL="2971800" indent="-228600" algn="l" defTabSz="914400" rtl="0" eaLnBrk="1" latinLnBrk="0" hangingPunct="1">
+              <a:lnSpc>
+                <a:spcPct val="90000"/>
+              </a:lnSpc>
+              <a:spcBef>
+                <a:spcPts val="500"/>
+              </a:spcBef>
+              <a:buFont typeface="Arial" panose="020B0604020202020204" pitchFamily="34" charset="0"/>
+              <a:buChar char="•"/>
+              <a:defRPr sz="1800" kern="1200">
+                <a:solidFill>
+                  <a:schemeClr val="tx1"/>
+                </a:solidFill>
+                <a:latin typeface="+mn-lt"/>
+                <a:ea typeface="+mn-ea"/>
+                <a:cs typeface="+mn-cs"/>
+              </a:defRPr>
+            </a:lvl7pPr>
+            <a:lvl8pPr marL="3429000" indent="-228600" algn="l" defTabSz="914400" rtl="0" eaLnBrk="1" latinLnBrk="0" hangingPunct="1">
+              <a:lnSpc>
+                <a:spcPct val="90000"/>
+              </a:lnSpc>
+              <a:spcBef>
+                <a:spcPts val="500"/>
+              </a:spcBef>
+              <a:buFont typeface="Arial" panose="020B0604020202020204" pitchFamily="34" charset="0"/>
+              <a:buChar char="•"/>
+              <a:defRPr sz="1800" kern="1200">
+                <a:solidFill>
+                  <a:schemeClr val="tx1"/>
+                </a:solidFill>
+                <a:latin typeface="+mn-lt"/>
+                <a:ea typeface="+mn-ea"/>
+                <a:cs typeface="+mn-cs"/>
+              </a:defRPr>
+            </a:lvl8pPr>
+            <a:lvl9pPr marL="3886200" indent="-228600" algn="l" defTabSz="914400" rtl="0" eaLnBrk="1" latinLnBrk="0" hangingPunct="1">
+              <a:lnSpc>
+                <a:spcPct val="90000"/>
+              </a:lnSpc>
+              <a:spcBef>
+                <a:spcPts val="500"/>
+              </a:spcBef>
+              <a:buFont typeface="Arial" panose="020B0604020202020204" pitchFamily="34" charset="0"/>
+              <a:buChar char="•"/>
+              <a:defRPr sz="1800" kern="1200">
+                <a:solidFill>
+                  <a:schemeClr val="tx1"/>
+                </a:solidFill>
+                <a:latin typeface="+mn-lt"/>
+                <a:ea typeface="+mn-ea"/>
+                <a:cs typeface="+mn-cs"/>
+              </a:defRPr>
+            </a:lvl9pPr>
+          </a:lstStyle>
+          <a:p>
+            <a:pPr>
+              <a:lnSpc>
+                <a:spcPct val="100000"/>
+              </a:lnSpc>
+            </a:pPr>
+            <a:r>
+              <a:rPr lang="en-US"/>
+              <a:t>Technologies Leveraged</a:t>
+            </a:r>
+          </a:p>
+        </p:txBody>
+      </p:sp>
+      <p:cxnSp>
+        <p:nvCxnSpPr>
+          <p:cNvPr id="27" name="Straight Connector 26">
+            <a:extLst>
+              <a:ext uri="{FF2B5EF4-FFF2-40B4-BE49-F238E27FC236}">
+                <a16:creationId xmlns:a16="http://schemas.microsoft.com/office/drawing/2014/main" id="{5AB4BBB4-719E-4504-877D-0A00BCCDE9A1}"/>
+              </a:ext>
+            </a:extLst>
+          </p:cNvPr>
+          <p:cNvCxnSpPr>
+            <a:cxnSpLocks/>
+          </p:cNvCxnSpPr>
+          <p:nvPr/>
+        </p:nvCxnSpPr>
+        <p:spPr>
+          <a:xfrm>
+            <a:off x="604738" y="5450118"/>
+            <a:ext cx="5201702" cy="0"/>
+          </a:xfrm>
+          <a:prstGeom prst="line">
+            <a:avLst/>
+          </a:prstGeom>
+          <a:ln>
+            <a:solidFill>
+              <a:schemeClr val="bg1">
+                <a:lumMod val="85000"/>
+              </a:schemeClr>
+            </a:solidFill>
+          </a:ln>
+        </p:spPr>
+        <p:style>
+          <a:lnRef idx="1">
+            <a:schemeClr val="accent1"/>
+          </a:lnRef>
+          <a:fillRef idx="0">
+            <a:schemeClr val="accent1"/>
+          </a:fillRef>
+          <a:effectRef idx="0">
+            <a:schemeClr val="accent1"/>
+          </a:effectRef>
+          <a:fontRef idx="minor">
+            <a:schemeClr val="tx1"/>
+          </a:fontRef>
+        </p:style>
+      </p:cxnSp>
+    </p:spTree>
+    <p:extLst>
+      <p:ext uri="{BB962C8B-B14F-4D97-AF65-F5344CB8AC3E}">
+        <p14:creationId xmlns:p14="http://schemas.microsoft.com/office/powerpoint/2010/main" val="2954688185"/>
+      </p:ext>
+    </p:extLst>
+  </p:cSld>
+  <p:clrMapOvr>
+    <a:masterClrMapping/>
+  </p:clrMapOvr>
+</p:sld>
+</file>
+
+<file path=ppt/slides/slide3.xml><?xml version="1.0" encoding="utf-8"?>
 <p:sld xmlns:a="http://schemas.openxmlformats.org/drawingml/2006/main" xmlns:r="http://schemas.openxmlformats.org/officeDocument/2006/relationships" xmlns:p="http://schemas.openxmlformats.org/presentationml/2006/main">
   <p:cSld>
     <p:spTree>
@@ -23360,7 +25573,7 @@
 </p:sld>
 </file>
 
-<file path=ppt/slides/slide3.xml><?xml version="1.0" encoding="utf-8"?>
+<file path=ppt/slides/slide4.xml><?xml version="1.0" encoding="utf-8"?>
 <p:sld xmlns:a="http://schemas.openxmlformats.org/drawingml/2006/main" xmlns:r="http://schemas.openxmlformats.org/officeDocument/2006/relationships" xmlns:p="http://schemas.openxmlformats.org/presentationml/2006/main">
   <p:cSld>
     <p:spTree>
@@ -23787,482 +26000,6 @@
     <p:extLst>
       <p:ext uri="{BB962C8B-B14F-4D97-AF65-F5344CB8AC3E}">
         <p14:creationId xmlns:p14="http://schemas.microsoft.com/office/powerpoint/2010/main" val="4180042075"/>
-      </p:ext>
-    </p:extLst>
-  </p:cSld>
-  <p:clrMapOvr>
-    <a:masterClrMapping/>
-  </p:clrMapOvr>
-</p:sld>
-</file>
-
-<file path=ppt/slides/slide4.xml><?xml version="1.0" encoding="utf-8"?>
-<p:sld xmlns:a="http://schemas.openxmlformats.org/drawingml/2006/main" xmlns:r="http://schemas.openxmlformats.org/officeDocument/2006/relationships" xmlns:p="http://schemas.openxmlformats.org/presentationml/2006/main">
-  <p:cSld>
-    <p:spTree>
-      <p:nvGrpSpPr>
-        <p:cNvPr id="1" name=""/>
-        <p:cNvGrpSpPr/>
-        <p:nvPr/>
-      </p:nvGrpSpPr>
-      <p:grpSpPr>
-        <a:xfrm>
-          <a:off x="0" y="0"/>
-          <a:ext cx="0" cy="0"/>
-          <a:chOff x="0" y="0"/>
-          <a:chExt cx="0" cy="0"/>
-        </a:xfrm>
-      </p:grpSpPr>
-      <p:sp>
-        <p:nvSpPr>
-          <p:cNvPr id="4" name="Title 3">
-            <a:extLst>
-              <a:ext uri="{FF2B5EF4-FFF2-40B4-BE49-F238E27FC236}">
-                <a16:creationId xmlns:a16="http://schemas.microsoft.com/office/drawing/2014/main" id="{B46056A9-800D-4D02-A379-968FFCF2FEB7}"/>
-              </a:ext>
-            </a:extLst>
-          </p:cNvPr>
-          <p:cNvSpPr>
-            <a:spLocks noGrp="1"/>
-          </p:cNvSpPr>
-          <p:nvPr>
-            <p:ph type="title"/>
-          </p:nvPr>
-        </p:nvSpPr>
-        <p:spPr>
-          <a:xfrm>
-            <a:off x="561307" y="156367"/>
-            <a:ext cx="10982522" cy="387798"/>
-          </a:xfrm>
-        </p:spPr>
-        <p:txBody>
-          <a:bodyPr/>
-          <a:lstStyle/>
-          <a:p>
-            <a:r>
-              <a:rPr lang="en-IN" dirty="0">
-                <a:solidFill>
-                  <a:schemeClr val="accent4">
-                    <a:lumMod val="75000"/>
-                    <a:lumOff val="25000"/>
-                  </a:schemeClr>
-                </a:solidFill>
-              </a:rPr>
-              <a:t>What is your idea for the solution?</a:t>
-            </a:r>
-          </a:p>
-        </p:txBody>
-      </p:sp>
-      <p:sp>
-        <p:nvSpPr>
-          <p:cNvPr id="2" name="TextBox 1">
-            <a:extLst>
-              <a:ext uri="{FF2B5EF4-FFF2-40B4-BE49-F238E27FC236}">
-                <a16:creationId xmlns:a16="http://schemas.microsoft.com/office/drawing/2014/main" id="{2A29A2E8-9DCD-21AB-50B1-C0FCBD4394D2}"/>
-              </a:ext>
-            </a:extLst>
-          </p:cNvPr>
-          <p:cNvSpPr txBox="1"/>
-          <p:nvPr/>
-        </p:nvSpPr>
-        <p:spPr>
-          <a:xfrm>
-            <a:off x="600782" y="697508"/>
-            <a:ext cx="8735787" cy="5940088"/>
-          </a:xfrm>
-          <a:prstGeom prst="rect">
-            <a:avLst/>
-          </a:prstGeom>
-          <a:noFill/>
-        </p:spPr>
-        <p:txBody>
-          <a:bodyPr wrap="square" lIns="91440" tIns="45720" rIns="91440" bIns="45720" rtlCol="0" anchor="t">
-            <a:spAutoFit/>
-          </a:bodyPr>
-          <a:lstStyle/>
-          <a:p>
-            <a:pPr algn="just"/>
-            <a:r>
-              <a:rPr lang="en-GB" b="1" dirty="0"/>
-              <a:t>Solution: </a:t>
-            </a:r>
-          </a:p>
-          <a:p>
-            <a:pPr marL="285750" indent="-285750" algn="just">
-              <a:buFont typeface="Arial" panose="020B0604020202020204" pitchFamily="34" charset="0"/>
-              <a:buChar char="•"/>
-            </a:pPr>
-            <a:r>
-              <a:rPr lang="en-GB" dirty="0">
-                <a:latin typeface="Calibri" panose="020F0502020204030204" pitchFamily="34" charset="0"/>
-                <a:ea typeface="Calibri" panose="020F0502020204030204" pitchFamily="34" charset="0"/>
-                <a:cs typeface="Calibri" panose="020F0502020204030204" pitchFamily="34" charset="0"/>
-              </a:rPr>
-              <a:t>In response to the critical issue of e-waste disposal, we present an </a:t>
-            </a:r>
-          </a:p>
-          <a:p>
-            <a:pPr algn="just"/>
-            <a:r>
-              <a:rPr lang="en-GB" sz="2000" b="1" dirty="0">
-                <a:solidFill>
-                  <a:srgbClr val="00B0F0"/>
-                </a:solidFill>
-                <a:latin typeface="Calibri" panose="020F0502020204030204" pitchFamily="34" charset="0"/>
-                <a:ea typeface="Calibri" panose="020F0502020204030204" pitchFamily="34" charset="0"/>
-                <a:cs typeface="Calibri" panose="020F0502020204030204" pitchFamily="34" charset="0"/>
-              </a:rPr>
-              <a:t>    </a:t>
-            </a:r>
-            <a:r>
-              <a:rPr lang="en-GB" sz="2000" b="1" dirty="0">
-                <a:solidFill>
-                  <a:srgbClr val="0070C0"/>
-                </a:solidFill>
-                <a:latin typeface="Calibri" panose="020F0502020204030204" pitchFamily="34" charset="0"/>
-                <a:ea typeface="Calibri" panose="020F0502020204030204" pitchFamily="34" charset="0"/>
-                <a:cs typeface="Calibri" panose="020F0502020204030204" pitchFamily="34" charset="0"/>
-              </a:rPr>
-              <a:t>Integrated web platform. </a:t>
-            </a:r>
-            <a:r>
-              <a:rPr lang="en-GB" dirty="0">
-                <a:latin typeface="Calibri" panose="020F0502020204030204" pitchFamily="34" charset="0"/>
-                <a:ea typeface="Calibri" panose="020F0502020204030204" pitchFamily="34" charset="0"/>
-                <a:cs typeface="Calibri" panose="020F0502020204030204" pitchFamily="34" charset="0"/>
-              </a:rPr>
-              <a:t>This solution is characterized by:</a:t>
-            </a:r>
-          </a:p>
-          <a:p>
-            <a:pPr marL="285750" indent="-285750" algn="just">
-              <a:buFont typeface="Arial" panose="020B0604020202020204" pitchFamily="34" charset="0"/>
-              <a:buChar char="•"/>
-            </a:pPr>
-            <a:r>
-              <a:rPr lang="en-GB" b="1" dirty="0">
-                <a:latin typeface="Calibri" panose="020F0502020204030204" pitchFamily="34" charset="0"/>
-                <a:ea typeface="Calibri" panose="020F0502020204030204" pitchFamily="34" charset="0"/>
-                <a:cs typeface="Calibri" panose="020F0502020204030204" pitchFamily="34" charset="0"/>
-              </a:rPr>
-              <a:t>User-Friendly Interface: </a:t>
-            </a:r>
-            <a:r>
-              <a:rPr lang="en-GB" dirty="0">
-                <a:latin typeface="Calibri" panose="020F0502020204030204" pitchFamily="34" charset="0"/>
-                <a:ea typeface="Calibri" panose="020F0502020204030204" pitchFamily="34" charset="0"/>
-                <a:cs typeface="Calibri" panose="020F0502020204030204" pitchFamily="34" charset="0"/>
-              </a:rPr>
-              <a:t>Our platform boasts an intuitive design, ensuring a seamless experience for all users.</a:t>
-            </a:r>
-          </a:p>
-          <a:p>
-            <a:pPr marL="285750" indent="-285750" algn="just">
-              <a:buFont typeface="Arial" panose="020B0604020202020204" pitchFamily="34" charset="0"/>
-              <a:buChar char="•"/>
-            </a:pPr>
-            <a:r>
-              <a:rPr lang="en-GB" b="1" dirty="0">
-                <a:latin typeface="Calibri" panose="020F0502020204030204" pitchFamily="34" charset="0"/>
-                <a:ea typeface="Calibri" panose="020F0502020204030204" pitchFamily="34" charset="0"/>
-                <a:cs typeface="Calibri" panose="020F0502020204030204" pitchFamily="34" charset="0"/>
-              </a:rPr>
-              <a:t>Advanced Technology Stack: </a:t>
-            </a:r>
-            <a:r>
-              <a:rPr lang="en-GB" dirty="0">
-                <a:latin typeface="Calibri" panose="020F0502020204030204" pitchFamily="34" charset="0"/>
-                <a:ea typeface="Calibri" panose="020F0502020204030204" pitchFamily="34" charset="0"/>
-                <a:cs typeface="Calibri" panose="020F0502020204030204" pitchFamily="34" charset="0"/>
-              </a:rPr>
-              <a:t>Leveraging cutting-edge technology, like Nextjs, Expressjs/Nodejs, MongoDB, </a:t>
-            </a:r>
-            <a:r>
-              <a:rPr lang="en-GB" dirty="0" err="1">
-                <a:latin typeface="Calibri" panose="020F0502020204030204" pitchFamily="34" charset="0"/>
-                <a:ea typeface="Calibri" panose="020F0502020204030204" pitchFamily="34" charset="0"/>
-                <a:cs typeface="Calibri" panose="020F0502020204030204" pitchFamily="34" charset="0"/>
-              </a:rPr>
-              <a:t>MapBox</a:t>
-            </a:r>
-            <a:r>
-              <a:rPr lang="en-GB" dirty="0">
-                <a:latin typeface="Calibri" panose="020F0502020204030204" pitchFamily="34" charset="0"/>
-                <a:ea typeface="Calibri" panose="020F0502020204030204" pitchFamily="34" charset="0"/>
-                <a:cs typeface="Calibri" panose="020F0502020204030204" pitchFamily="34" charset="0"/>
-              </a:rPr>
-              <a:t> map API our platform ensures robust functionality and efficiency.</a:t>
-            </a:r>
-          </a:p>
-          <a:p>
-            <a:pPr marL="285750" indent="-285750" algn="just">
-              <a:buFont typeface="Arial" panose="020B0604020202020204" pitchFamily="34" charset="0"/>
-              <a:buChar char="•"/>
-            </a:pPr>
-            <a:r>
-              <a:rPr lang="en-GB" b="1" dirty="0">
-                <a:latin typeface="Calibri" panose="020F0502020204030204" pitchFamily="34" charset="0"/>
-                <a:ea typeface="Calibri" panose="020F0502020204030204" pitchFamily="34" charset="0"/>
-                <a:cs typeface="Calibri" panose="020F0502020204030204" pitchFamily="34" charset="0"/>
-              </a:rPr>
-              <a:t>Key Features:</a:t>
-            </a:r>
-            <a:endParaRPr lang="en-GB" dirty="0">
-              <a:latin typeface="Calibri" panose="020F0502020204030204" pitchFamily="34" charset="0"/>
-              <a:ea typeface="Calibri" panose="020F0502020204030204" pitchFamily="34" charset="0"/>
-              <a:cs typeface="Calibri" panose="020F0502020204030204" pitchFamily="34" charset="0"/>
-            </a:endParaRPr>
-          </a:p>
-          <a:p>
-            <a:pPr marL="285750" indent="-285750" algn="just">
-              <a:buFont typeface="Arial" panose="020B0604020202020204" pitchFamily="34" charset="0"/>
-              <a:buChar char="•"/>
-            </a:pPr>
-            <a:r>
-              <a:rPr lang="en-GB" b="1" dirty="0">
-                <a:latin typeface="Calibri" panose="020F0502020204030204" pitchFamily="34" charset="0"/>
-                <a:ea typeface="Calibri" panose="020F0502020204030204" pitchFamily="34" charset="0"/>
-                <a:cs typeface="Calibri" panose="020F0502020204030204" pitchFamily="34" charset="0"/>
-              </a:rPr>
-              <a:t>User Education: </a:t>
-            </a:r>
-            <a:r>
-              <a:rPr lang="en-GB" dirty="0">
-                <a:latin typeface="Calibri" panose="020F0502020204030204" pitchFamily="34" charset="0"/>
-                <a:ea typeface="Calibri" panose="020F0502020204030204" pitchFamily="34" charset="0"/>
-                <a:cs typeface="Calibri" panose="020F0502020204030204" pitchFamily="34" charset="0"/>
-              </a:rPr>
-              <a:t>Empowering users with knowledge about e-waste disposal best practices.</a:t>
-            </a:r>
-          </a:p>
-          <a:p>
-            <a:pPr marL="285750" indent="-285750" algn="just">
-              <a:buFont typeface="Arial" panose="020B0604020202020204" pitchFamily="34" charset="0"/>
-              <a:buChar char="•"/>
-            </a:pPr>
-            <a:r>
-              <a:rPr lang="en-GB" b="1" dirty="0">
-                <a:latin typeface="Calibri" panose="020F0502020204030204" pitchFamily="34" charset="0"/>
-                <a:ea typeface="Calibri" panose="020F0502020204030204" pitchFamily="34" charset="0"/>
-                <a:cs typeface="Calibri" panose="020F0502020204030204" pitchFamily="34" charset="0"/>
-              </a:rPr>
-              <a:t>Booking System: </a:t>
-            </a:r>
-            <a:r>
-              <a:rPr lang="en-GB" dirty="0">
-                <a:latin typeface="Calibri" panose="020F0502020204030204" pitchFamily="34" charset="0"/>
-                <a:ea typeface="Calibri" panose="020F0502020204030204" pitchFamily="34" charset="0"/>
-                <a:cs typeface="Calibri" panose="020F0502020204030204" pitchFamily="34" charset="0"/>
-              </a:rPr>
-              <a:t>Enables users to easily schedule pickups for their electronic devices, fostering a user-friendly experience.</a:t>
-            </a:r>
-          </a:p>
-          <a:p>
-            <a:pPr marL="285750" indent="-285750" algn="just">
-              <a:buFont typeface="Arial" panose="020B0604020202020204" pitchFamily="34" charset="0"/>
-              <a:buChar char="•"/>
-            </a:pPr>
-            <a:r>
-              <a:rPr lang="en-GB" b="1" dirty="0">
-                <a:latin typeface="Calibri" panose="020F0502020204030204" pitchFamily="34" charset="0"/>
-                <a:ea typeface="Calibri" panose="020F0502020204030204" pitchFamily="34" charset="0"/>
-                <a:cs typeface="Calibri" panose="020F0502020204030204" pitchFamily="34" charset="0"/>
-              </a:rPr>
-              <a:t>Location-Based Services- </a:t>
-            </a:r>
-            <a:r>
-              <a:rPr lang="en-GB" dirty="0">
-                <a:latin typeface="Calibri" panose="020F0502020204030204" pitchFamily="34" charset="0"/>
-                <a:ea typeface="Calibri" panose="020F0502020204030204" pitchFamily="34" charset="0"/>
-                <a:cs typeface="Calibri" panose="020F0502020204030204" pitchFamily="34" charset="0"/>
-              </a:rPr>
-              <a:t>Helps users locate and connect with nearby recycling facilities, promoting accessibility and convenience.</a:t>
-            </a:r>
-          </a:p>
-          <a:p>
-            <a:pPr marL="285750" indent="-285750" algn="just">
-              <a:buFont typeface="Arial" panose="020B0604020202020204" pitchFamily="34" charset="0"/>
-              <a:buChar char="•"/>
-            </a:pPr>
-            <a:r>
-              <a:rPr lang="en-GB" b="1" dirty="0">
-                <a:latin typeface="Calibri" panose="020F0502020204030204" pitchFamily="34" charset="0"/>
-                <a:ea typeface="Calibri" panose="020F0502020204030204" pitchFamily="34" charset="0"/>
-                <a:cs typeface="Calibri" panose="020F0502020204030204" pitchFamily="34" charset="0"/>
-              </a:rPr>
-              <a:t>Educational Blog Section- </a:t>
-            </a:r>
-            <a:r>
-              <a:rPr lang="en-GB" dirty="0">
-                <a:latin typeface="Calibri" panose="020F0502020204030204" pitchFamily="34" charset="0"/>
-                <a:ea typeface="Calibri" panose="020F0502020204030204" pitchFamily="34" charset="0"/>
-                <a:cs typeface="Calibri" panose="020F0502020204030204" pitchFamily="34" charset="0"/>
-              </a:rPr>
-              <a:t>Provides a valuable resource for users to access information about the environmental impact of e-waste and sustainable  consumption practices.</a:t>
-            </a:r>
-          </a:p>
-          <a:p>
-            <a:pPr marL="285750" indent="-285750" algn="just">
-              <a:buFont typeface="Arial" panose="020B0604020202020204" pitchFamily="34" charset="0"/>
-              <a:buChar char="•"/>
-            </a:pPr>
-            <a:r>
-              <a:rPr lang="en-GB" b="1" dirty="0">
-                <a:latin typeface="Calibri" panose="020F0502020204030204" pitchFamily="34" charset="0"/>
-                <a:ea typeface="Calibri" panose="020F0502020204030204" pitchFamily="34" charset="0"/>
-                <a:cs typeface="Calibri" panose="020F0502020204030204" pitchFamily="34" charset="0"/>
-              </a:rPr>
-              <a:t>Repository of Rules and Regulations- </a:t>
-            </a:r>
-            <a:r>
-              <a:rPr lang="en-GB" dirty="0">
-                <a:latin typeface="Calibri" panose="020F0502020204030204" pitchFamily="34" charset="0"/>
-                <a:ea typeface="Calibri" panose="020F0502020204030204" pitchFamily="34" charset="0"/>
-                <a:cs typeface="Calibri" panose="020F0502020204030204" pitchFamily="34" charset="0"/>
-              </a:rPr>
-              <a:t>Acts as a centralized source for users to stay informed about the legal frameworks governing e-waste management.</a:t>
-            </a:r>
-          </a:p>
-          <a:p>
-            <a:pPr marL="285750" indent="-285750" algn="just">
-              <a:buFont typeface="Arial" panose="020B0604020202020204" pitchFamily="34" charset="0"/>
-              <a:buChar char="•"/>
-            </a:pPr>
-            <a:endParaRPr lang="en-GB" dirty="0">
-              <a:cs typeface="Segoe UI"/>
-            </a:endParaRPr>
-          </a:p>
-          <a:p>
-            <a:pPr marL="285750" indent="-285750" algn="just">
-              <a:buFont typeface="Arial" panose="020B0604020202020204" pitchFamily="34" charset="0"/>
-              <a:buChar char="•"/>
-            </a:pPr>
-            <a:endParaRPr lang="en-GB" dirty="0">
-              <a:cs typeface="Segoe UI"/>
-            </a:endParaRPr>
-          </a:p>
-        </p:txBody>
-      </p:sp>
-      <p:sp>
-        <p:nvSpPr>
-          <p:cNvPr id="3" name="AutoShape 2" descr="13,403 E Waste Recycling Illustrations - Free in SVG, PNG, EPS - IconScout">
-            <a:extLst>
-              <a:ext uri="{FF2B5EF4-FFF2-40B4-BE49-F238E27FC236}">
-                <a16:creationId xmlns:a16="http://schemas.microsoft.com/office/drawing/2014/main" id="{E9C7D5DB-8DB1-139B-3677-FEF0C86C041F}"/>
-              </a:ext>
-            </a:extLst>
-          </p:cNvPr>
-          <p:cNvSpPr>
-            <a:spLocks noChangeAspect="1" noChangeArrowheads="1"/>
-          </p:cNvSpPr>
-          <p:nvPr/>
-        </p:nvSpPr>
-        <p:spPr bwMode="auto">
-          <a:xfrm>
-            <a:off x="8303077" y="2809935"/>
-            <a:ext cx="3624943" cy="3624943"/>
-          </a:xfrm>
-          <a:prstGeom prst="rect">
-            <a:avLst/>
-          </a:prstGeom>
-          <a:noFill/>
-          <a:extLst>
-            <a:ext uri="{909E8E84-426E-40DD-AFC4-6F175D3DCCD1}">
-              <a14:hiddenFill xmlns:a14="http://schemas.microsoft.com/office/drawing/2010/main">
-                <a:solidFill>
-                  <a:srgbClr val="FFFFFF"/>
-                </a:solidFill>
-              </a14:hiddenFill>
-            </a:ext>
-          </a:extLst>
-        </p:spPr>
-        <p:txBody>
-          <a:bodyPr vert="horz" wrap="square" lIns="91440" tIns="45720" rIns="91440" bIns="45720" numCol="1" anchor="t" anchorCtr="0" compatLnSpc="1">
-            <a:prstTxWarp prst="textNoShape">
-              <a:avLst/>
-            </a:prstTxWarp>
-          </a:bodyPr>
-          <a:lstStyle/>
-          <a:p>
-            <a:endParaRPr lang="en-IN"/>
-          </a:p>
-        </p:txBody>
-      </p:sp>
-      <p:pic>
-        <p:nvPicPr>
-          <p:cNvPr id="6" name="Picture 5">
-            <a:extLst>
-              <a:ext uri="{FF2B5EF4-FFF2-40B4-BE49-F238E27FC236}">
-                <a16:creationId xmlns:a16="http://schemas.microsoft.com/office/drawing/2014/main" id="{C1B8835F-1695-8025-FF0C-FE6B8ACA07DE}"/>
-              </a:ext>
-            </a:extLst>
-          </p:cNvPr>
-          <p:cNvPicPr>
-            <a:picLocks noChangeAspect="1"/>
-          </p:cNvPicPr>
-          <p:nvPr/>
-        </p:nvPicPr>
-        <p:blipFill>
-          <a:blip r:embed="rId2">
-            <a:extLst>
-              <a:ext uri="{28A0092B-C50C-407E-A947-70E740481C1C}">
-                <a14:useLocalDpi xmlns:a14="http://schemas.microsoft.com/office/drawing/2010/main" val="0"/>
-              </a:ext>
-            </a:extLst>
-          </a:blip>
-          <a:stretch>
-            <a:fillRect/>
-          </a:stretch>
-        </p:blipFill>
-        <p:spPr>
-          <a:xfrm>
-            <a:off x="9391000" y="2130226"/>
-            <a:ext cx="2278487" cy="2278487"/>
-          </a:xfrm>
-          <a:prstGeom prst="rect">
-            <a:avLst/>
-          </a:prstGeom>
-        </p:spPr>
-      </p:pic>
-      <p:sp>
-        <p:nvSpPr>
-          <p:cNvPr id="7" name="TextBox 6">
-            <a:extLst>
-              <a:ext uri="{FF2B5EF4-FFF2-40B4-BE49-F238E27FC236}">
-                <a16:creationId xmlns:a16="http://schemas.microsoft.com/office/drawing/2014/main" id="{107179B5-D314-BE2D-231D-F5CCEB0CFB0C}"/>
-              </a:ext>
-            </a:extLst>
-          </p:cNvPr>
-          <p:cNvSpPr txBox="1"/>
-          <p:nvPr/>
-        </p:nvSpPr>
-        <p:spPr>
-          <a:xfrm>
-            <a:off x="9336569" y="4100936"/>
-            <a:ext cx="2582636" cy="307777"/>
-          </a:xfrm>
-          <a:prstGeom prst="rect">
-            <a:avLst/>
-          </a:prstGeom>
-          <a:noFill/>
-        </p:spPr>
-        <p:txBody>
-          <a:bodyPr wrap="square" rtlCol="0">
-            <a:spAutoFit/>
-          </a:bodyPr>
-          <a:lstStyle/>
-          <a:p>
-            <a:r>
-              <a:rPr lang="en-IN" sz="1400" b="1"/>
-              <a:t>E-Waste Recycling Platform</a:t>
-            </a:r>
-          </a:p>
-        </p:txBody>
-      </p:sp>
-    </p:spTree>
-    <p:extLst>
-      <p:ext uri="{BB962C8B-B14F-4D97-AF65-F5344CB8AC3E}">
-        <p14:creationId xmlns:p14="http://schemas.microsoft.com/office/powerpoint/2010/main" val="1190491742"/>
       </p:ext>
     </p:extLst>
   </p:cSld>
@@ -24307,7 +26044,7 @@
         </p:nvSpPr>
         <p:spPr>
           <a:xfrm>
-            <a:off x="583719" y="346867"/>
+            <a:off x="561307" y="156367"/>
             <a:ext cx="10982522" cy="387798"/>
           </a:xfrm>
         </p:spPr>
@@ -24316,7 +26053,7 @@
           <a:lstStyle/>
           <a:p>
             <a:r>
-              <a:rPr lang="en-IN">
+              <a:rPr lang="en-IN" dirty="0">
                 <a:solidFill>
                   <a:schemeClr val="accent4">
                     <a:lumMod val="75000"/>
@@ -24324,7 +26061,7 @@
                   </a:schemeClr>
                 </a:solidFill>
               </a:rPr>
-              <a:t>What domains does it address? What is the impact?</a:t>
+              <a:t>What is your idea for the solution?</a:t>
             </a:r>
           </a:p>
         </p:txBody>
@@ -24334,7 +26071,7 @@
           <p:cNvPr id="2" name="TextBox 1">
             <a:extLst>
               <a:ext uri="{FF2B5EF4-FFF2-40B4-BE49-F238E27FC236}">
-                <a16:creationId xmlns:a16="http://schemas.microsoft.com/office/drawing/2014/main" id="{81AD24DE-3BF3-6B08-7D70-02D5EFCF97FB}"/>
+                <a16:creationId xmlns:a16="http://schemas.microsoft.com/office/drawing/2014/main" id="{2A29A2E8-9DCD-21AB-50B1-C0FCBD4394D2}"/>
               </a:ext>
             </a:extLst>
           </p:cNvPr>
@@ -24343,8 +26080,379 @@
         </p:nvSpPr>
         <p:spPr>
           <a:xfrm>
-            <a:off x="360447" y="915446"/>
-            <a:ext cx="11247834" cy="5509200"/>
+            <a:off x="600782" y="697508"/>
+            <a:ext cx="8735787" cy="5940088"/>
+          </a:xfrm>
+          <a:prstGeom prst="rect">
+            <a:avLst/>
+          </a:prstGeom>
+          <a:noFill/>
+        </p:spPr>
+        <p:txBody>
+          <a:bodyPr wrap="square" lIns="91440" tIns="45720" rIns="91440" bIns="45720" rtlCol="0" anchor="t">
+            <a:spAutoFit/>
+          </a:bodyPr>
+          <a:lstStyle/>
+          <a:p>
+            <a:pPr algn="just"/>
+            <a:r>
+              <a:rPr lang="en-GB" b="1" dirty="0"/>
+              <a:t>Solution: </a:t>
+            </a:r>
+          </a:p>
+          <a:p>
+            <a:pPr marL="285750" indent="-285750" algn="just">
+              <a:buFont typeface="Arial" panose="020B0604020202020204" pitchFamily="34" charset="0"/>
+              <a:buChar char="•"/>
+            </a:pPr>
+            <a:r>
+              <a:rPr lang="en-GB" dirty="0">
+                <a:latin typeface="Calibri" panose="020F0502020204030204" pitchFamily="34" charset="0"/>
+                <a:ea typeface="Calibri" panose="020F0502020204030204" pitchFamily="34" charset="0"/>
+                <a:cs typeface="Calibri" panose="020F0502020204030204" pitchFamily="34" charset="0"/>
+              </a:rPr>
+              <a:t>In response to the critical issue of e-waste disposal, we present an </a:t>
+            </a:r>
+          </a:p>
+          <a:p>
+            <a:pPr algn="just"/>
+            <a:r>
+              <a:rPr lang="en-GB" sz="2000" b="1" dirty="0">
+                <a:solidFill>
+                  <a:srgbClr val="00B0F0"/>
+                </a:solidFill>
+                <a:latin typeface="Calibri" panose="020F0502020204030204" pitchFamily="34" charset="0"/>
+                <a:ea typeface="Calibri" panose="020F0502020204030204" pitchFamily="34" charset="0"/>
+                <a:cs typeface="Calibri" panose="020F0502020204030204" pitchFamily="34" charset="0"/>
+              </a:rPr>
+              <a:t>    </a:t>
+            </a:r>
+            <a:r>
+              <a:rPr lang="en-GB" sz="2000" b="1" dirty="0">
+                <a:solidFill>
+                  <a:srgbClr val="0070C0"/>
+                </a:solidFill>
+                <a:latin typeface="Calibri" panose="020F0502020204030204" pitchFamily="34" charset="0"/>
+                <a:ea typeface="Calibri" panose="020F0502020204030204" pitchFamily="34" charset="0"/>
+                <a:cs typeface="Calibri" panose="020F0502020204030204" pitchFamily="34" charset="0"/>
+              </a:rPr>
+              <a:t>Integrated web platform. </a:t>
+            </a:r>
+            <a:r>
+              <a:rPr lang="en-GB" dirty="0">
+                <a:latin typeface="Calibri" panose="020F0502020204030204" pitchFamily="34" charset="0"/>
+                <a:ea typeface="Calibri" panose="020F0502020204030204" pitchFamily="34" charset="0"/>
+                <a:cs typeface="Calibri" panose="020F0502020204030204" pitchFamily="34" charset="0"/>
+              </a:rPr>
+              <a:t>This solution is characterized by:</a:t>
+            </a:r>
+          </a:p>
+          <a:p>
+            <a:pPr marL="285750" indent="-285750" algn="just">
+              <a:buFont typeface="Arial" panose="020B0604020202020204" pitchFamily="34" charset="0"/>
+              <a:buChar char="•"/>
+            </a:pPr>
+            <a:r>
+              <a:rPr lang="en-GB" b="1" dirty="0">
+                <a:latin typeface="Calibri" panose="020F0502020204030204" pitchFamily="34" charset="0"/>
+                <a:ea typeface="Calibri" panose="020F0502020204030204" pitchFamily="34" charset="0"/>
+                <a:cs typeface="Calibri" panose="020F0502020204030204" pitchFamily="34" charset="0"/>
+              </a:rPr>
+              <a:t>User-Friendly Interface: </a:t>
+            </a:r>
+            <a:r>
+              <a:rPr lang="en-GB" dirty="0">
+                <a:latin typeface="Calibri" panose="020F0502020204030204" pitchFamily="34" charset="0"/>
+                <a:ea typeface="Calibri" panose="020F0502020204030204" pitchFamily="34" charset="0"/>
+                <a:cs typeface="Calibri" panose="020F0502020204030204" pitchFamily="34" charset="0"/>
+              </a:rPr>
+              <a:t>Our platform boasts an intuitive design, ensuring a seamless experience for all users.</a:t>
+            </a:r>
+          </a:p>
+          <a:p>
+            <a:pPr marL="285750" indent="-285750" algn="just">
+              <a:buFont typeface="Arial" panose="020B0604020202020204" pitchFamily="34" charset="0"/>
+              <a:buChar char="•"/>
+            </a:pPr>
+            <a:r>
+              <a:rPr lang="en-GB" b="1" dirty="0">
+                <a:latin typeface="Calibri" panose="020F0502020204030204" pitchFamily="34" charset="0"/>
+                <a:ea typeface="Calibri" panose="020F0502020204030204" pitchFamily="34" charset="0"/>
+                <a:cs typeface="Calibri" panose="020F0502020204030204" pitchFamily="34" charset="0"/>
+              </a:rPr>
+              <a:t>Advanced Technology Stack: </a:t>
+            </a:r>
+            <a:r>
+              <a:rPr lang="en-GB" dirty="0">
+                <a:latin typeface="Calibri" panose="020F0502020204030204" pitchFamily="34" charset="0"/>
+                <a:ea typeface="Calibri" panose="020F0502020204030204" pitchFamily="34" charset="0"/>
+                <a:cs typeface="Calibri" panose="020F0502020204030204" pitchFamily="34" charset="0"/>
+              </a:rPr>
+              <a:t>Leveraging cutting-edge technology, like Nextjs, Expressjs/Nodejs, MongoDB, </a:t>
+            </a:r>
+            <a:r>
+              <a:rPr lang="en-GB" dirty="0" err="1">
+                <a:latin typeface="Calibri" panose="020F0502020204030204" pitchFamily="34" charset="0"/>
+                <a:ea typeface="Calibri" panose="020F0502020204030204" pitchFamily="34" charset="0"/>
+                <a:cs typeface="Calibri" panose="020F0502020204030204" pitchFamily="34" charset="0"/>
+              </a:rPr>
+              <a:t>MapBox</a:t>
+            </a:r>
+            <a:r>
+              <a:rPr lang="en-GB" dirty="0">
+                <a:latin typeface="Calibri" panose="020F0502020204030204" pitchFamily="34" charset="0"/>
+                <a:ea typeface="Calibri" panose="020F0502020204030204" pitchFamily="34" charset="0"/>
+                <a:cs typeface="Calibri" panose="020F0502020204030204" pitchFamily="34" charset="0"/>
+              </a:rPr>
+              <a:t> map API our platform ensures robust functionality and efficiency.</a:t>
+            </a:r>
+          </a:p>
+          <a:p>
+            <a:pPr marL="285750" indent="-285750" algn="just">
+              <a:buFont typeface="Arial" panose="020B0604020202020204" pitchFamily="34" charset="0"/>
+              <a:buChar char="•"/>
+            </a:pPr>
+            <a:r>
+              <a:rPr lang="en-GB" b="1" dirty="0">
+                <a:latin typeface="Calibri" panose="020F0502020204030204" pitchFamily="34" charset="0"/>
+                <a:ea typeface="Calibri" panose="020F0502020204030204" pitchFamily="34" charset="0"/>
+                <a:cs typeface="Calibri" panose="020F0502020204030204" pitchFamily="34" charset="0"/>
+              </a:rPr>
+              <a:t>Key Features:</a:t>
+            </a:r>
+            <a:endParaRPr lang="en-GB" dirty="0">
+              <a:latin typeface="Calibri" panose="020F0502020204030204" pitchFamily="34" charset="0"/>
+              <a:ea typeface="Calibri" panose="020F0502020204030204" pitchFamily="34" charset="0"/>
+              <a:cs typeface="Calibri" panose="020F0502020204030204" pitchFamily="34" charset="0"/>
+            </a:endParaRPr>
+          </a:p>
+          <a:p>
+            <a:pPr marL="285750" indent="-285750" algn="just">
+              <a:buFont typeface="Arial" panose="020B0604020202020204" pitchFamily="34" charset="0"/>
+              <a:buChar char="•"/>
+            </a:pPr>
+            <a:r>
+              <a:rPr lang="en-GB" b="1" dirty="0">
+                <a:latin typeface="Calibri" panose="020F0502020204030204" pitchFamily="34" charset="0"/>
+                <a:ea typeface="Calibri" panose="020F0502020204030204" pitchFamily="34" charset="0"/>
+                <a:cs typeface="Calibri" panose="020F0502020204030204" pitchFamily="34" charset="0"/>
+              </a:rPr>
+              <a:t>User Education: </a:t>
+            </a:r>
+            <a:r>
+              <a:rPr lang="en-GB" dirty="0">
+                <a:latin typeface="Calibri" panose="020F0502020204030204" pitchFamily="34" charset="0"/>
+                <a:ea typeface="Calibri" panose="020F0502020204030204" pitchFamily="34" charset="0"/>
+                <a:cs typeface="Calibri" panose="020F0502020204030204" pitchFamily="34" charset="0"/>
+              </a:rPr>
+              <a:t>Empowering users with knowledge about e-waste disposal best practices.</a:t>
+            </a:r>
+          </a:p>
+          <a:p>
+            <a:pPr marL="285750" indent="-285750" algn="just">
+              <a:buFont typeface="Arial" panose="020B0604020202020204" pitchFamily="34" charset="0"/>
+              <a:buChar char="•"/>
+            </a:pPr>
+            <a:r>
+              <a:rPr lang="en-GB" b="1" dirty="0">
+                <a:latin typeface="Calibri" panose="020F0502020204030204" pitchFamily="34" charset="0"/>
+                <a:ea typeface="Calibri" panose="020F0502020204030204" pitchFamily="34" charset="0"/>
+                <a:cs typeface="Calibri" panose="020F0502020204030204" pitchFamily="34" charset="0"/>
+              </a:rPr>
+              <a:t>Booking System: </a:t>
+            </a:r>
+            <a:r>
+              <a:rPr lang="en-GB" dirty="0">
+                <a:latin typeface="Calibri" panose="020F0502020204030204" pitchFamily="34" charset="0"/>
+                <a:ea typeface="Calibri" panose="020F0502020204030204" pitchFamily="34" charset="0"/>
+                <a:cs typeface="Calibri" panose="020F0502020204030204" pitchFamily="34" charset="0"/>
+              </a:rPr>
+              <a:t>Enables users to easily schedule pickups for their electronic devices, fostering a user-friendly experience.</a:t>
+            </a:r>
+          </a:p>
+          <a:p>
+            <a:pPr marL="285750" indent="-285750" algn="just">
+              <a:buFont typeface="Arial" panose="020B0604020202020204" pitchFamily="34" charset="0"/>
+              <a:buChar char="•"/>
+            </a:pPr>
+            <a:r>
+              <a:rPr lang="en-GB" b="1" dirty="0">
+                <a:latin typeface="Calibri" panose="020F0502020204030204" pitchFamily="34" charset="0"/>
+                <a:ea typeface="Calibri" panose="020F0502020204030204" pitchFamily="34" charset="0"/>
+                <a:cs typeface="Calibri" panose="020F0502020204030204" pitchFamily="34" charset="0"/>
+              </a:rPr>
+              <a:t>Location-Based Services- </a:t>
+            </a:r>
+            <a:r>
+              <a:rPr lang="en-GB" dirty="0">
+                <a:latin typeface="Calibri" panose="020F0502020204030204" pitchFamily="34" charset="0"/>
+                <a:ea typeface="Calibri" panose="020F0502020204030204" pitchFamily="34" charset="0"/>
+                <a:cs typeface="Calibri" panose="020F0502020204030204" pitchFamily="34" charset="0"/>
+              </a:rPr>
+              <a:t>Helps users locate and connect with nearby recycling facilities, promoting accessibility and convenience.</a:t>
+            </a:r>
+          </a:p>
+          <a:p>
+            <a:pPr marL="285750" indent="-285750" algn="just">
+              <a:buFont typeface="Arial" panose="020B0604020202020204" pitchFamily="34" charset="0"/>
+              <a:buChar char="•"/>
+            </a:pPr>
+            <a:r>
+              <a:rPr lang="en-GB" b="1" dirty="0">
+                <a:latin typeface="Calibri" panose="020F0502020204030204" pitchFamily="34" charset="0"/>
+                <a:ea typeface="Calibri" panose="020F0502020204030204" pitchFamily="34" charset="0"/>
+                <a:cs typeface="Calibri" panose="020F0502020204030204" pitchFamily="34" charset="0"/>
+              </a:rPr>
+              <a:t>Educational Blog Section- </a:t>
+            </a:r>
+            <a:r>
+              <a:rPr lang="en-GB" dirty="0">
+                <a:latin typeface="Calibri" panose="020F0502020204030204" pitchFamily="34" charset="0"/>
+                <a:ea typeface="Calibri" panose="020F0502020204030204" pitchFamily="34" charset="0"/>
+                <a:cs typeface="Calibri" panose="020F0502020204030204" pitchFamily="34" charset="0"/>
+              </a:rPr>
+              <a:t>Provides a valuable resource for users to access information about the environmental impact of e-waste and sustainable  consumption practices.</a:t>
+            </a:r>
+          </a:p>
+          <a:p>
+            <a:pPr marL="285750" indent="-285750" algn="just">
+              <a:buFont typeface="Arial" panose="020B0604020202020204" pitchFamily="34" charset="0"/>
+              <a:buChar char="•"/>
+            </a:pPr>
+            <a:r>
+              <a:rPr lang="en-GB" b="1" dirty="0">
+                <a:latin typeface="Calibri" panose="020F0502020204030204" pitchFamily="34" charset="0"/>
+                <a:ea typeface="Calibri" panose="020F0502020204030204" pitchFamily="34" charset="0"/>
+                <a:cs typeface="Calibri" panose="020F0502020204030204" pitchFamily="34" charset="0"/>
+              </a:rPr>
+              <a:t>Repository of Rules and Regulations- </a:t>
+            </a:r>
+            <a:r>
+              <a:rPr lang="en-GB" dirty="0">
+                <a:latin typeface="Calibri" panose="020F0502020204030204" pitchFamily="34" charset="0"/>
+                <a:ea typeface="Calibri" panose="020F0502020204030204" pitchFamily="34" charset="0"/>
+                <a:cs typeface="Calibri" panose="020F0502020204030204" pitchFamily="34" charset="0"/>
+              </a:rPr>
+              <a:t>Acts as a centralized source for users to stay informed about the legal frameworks governing e-waste management.</a:t>
+            </a:r>
+          </a:p>
+          <a:p>
+            <a:pPr marL="285750" indent="-285750" algn="just">
+              <a:buFont typeface="Arial" panose="020B0604020202020204" pitchFamily="34" charset="0"/>
+              <a:buChar char="•"/>
+            </a:pPr>
+            <a:endParaRPr lang="en-GB" dirty="0">
+              <a:cs typeface="Segoe UI"/>
+            </a:endParaRPr>
+          </a:p>
+          <a:p>
+            <a:pPr marL="285750" indent="-285750" algn="just">
+              <a:buFont typeface="Arial" panose="020B0604020202020204" pitchFamily="34" charset="0"/>
+              <a:buChar char="•"/>
+            </a:pPr>
+            <a:endParaRPr lang="en-GB" dirty="0">
+              <a:cs typeface="Segoe UI"/>
+            </a:endParaRPr>
+          </a:p>
+        </p:txBody>
+      </p:sp>
+      <p:sp>
+        <p:nvSpPr>
+          <p:cNvPr id="3" name="AutoShape 2" descr="13,403 E Waste Recycling Illustrations - Free in SVG, PNG, EPS - IconScout">
+            <a:extLst>
+              <a:ext uri="{FF2B5EF4-FFF2-40B4-BE49-F238E27FC236}">
+                <a16:creationId xmlns:a16="http://schemas.microsoft.com/office/drawing/2014/main" id="{E9C7D5DB-8DB1-139B-3677-FEF0C86C041F}"/>
+              </a:ext>
+            </a:extLst>
+          </p:cNvPr>
+          <p:cNvSpPr>
+            <a:spLocks noChangeAspect="1" noChangeArrowheads="1"/>
+          </p:cNvSpPr>
+          <p:nvPr/>
+        </p:nvSpPr>
+        <p:spPr bwMode="auto">
+          <a:xfrm>
+            <a:off x="8303077" y="2809935"/>
+            <a:ext cx="3624943" cy="3624943"/>
+          </a:xfrm>
+          <a:prstGeom prst="rect">
+            <a:avLst/>
+          </a:prstGeom>
+          <a:noFill/>
+          <a:extLst>
+            <a:ext uri="{909E8E84-426E-40DD-AFC4-6F175D3DCCD1}">
+              <a14:hiddenFill xmlns:a14="http://schemas.microsoft.com/office/drawing/2010/main">
+                <a:solidFill>
+                  <a:srgbClr val="FFFFFF"/>
+                </a:solidFill>
+              </a14:hiddenFill>
+            </a:ext>
+          </a:extLst>
+        </p:spPr>
+        <p:txBody>
+          <a:bodyPr vert="horz" wrap="square" lIns="91440" tIns="45720" rIns="91440" bIns="45720" numCol="1" anchor="t" anchorCtr="0" compatLnSpc="1">
+            <a:prstTxWarp prst="textNoShape">
+              <a:avLst/>
+            </a:prstTxWarp>
+          </a:bodyPr>
+          <a:lstStyle/>
+          <a:p>
+            <a:endParaRPr lang="en-IN"/>
+          </a:p>
+        </p:txBody>
+      </p:sp>
+      <p:pic>
+        <p:nvPicPr>
+          <p:cNvPr id="6" name="Picture 5">
+            <a:extLst>
+              <a:ext uri="{FF2B5EF4-FFF2-40B4-BE49-F238E27FC236}">
+                <a16:creationId xmlns:a16="http://schemas.microsoft.com/office/drawing/2014/main" id="{C1B8835F-1695-8025-FF0C-FE6B8ACA07DE}"/>
+              </a:ext>
+            </a:extLst>
+          </p:cNvPr>
+          <p:cNvPicPr>
+            <a:picLocks noChangeAspect="1"/>
+          </p:cNvPicPr>
+          <p:nvPr/>
+        </p:nvPicPr>
+        <p:blipFill>
+          <a:blip r:embed="rId2">
+            <a:extLst>
+              <a:ext uri="{28A0092B-C50C-407E-A947-70E740481C1C}">
+                <a14:useLocalDpi xmlns:a14="http://schemas.microsoft.com/office/drawing/2010/main" val="0"/>
+              </a:ext>
+            </a:extLst>
+          </a:blip>
+          <a:stretch>
+            <a:fillRect/>
+          </a:stretch>
+        </p:blipFill>
+        <p:spPr>
+          <a:xfrm>
+            <a:off x="9391000" y="2130226"/>
+            <a:ext cx="2278487" cy="2278487"/>
+          </a:xfrm>
+          <a:prstGeom prst="rect">
+            <a:avLst/>
+          </a:prstGeom>
+        </p:spPr>
+      </p:pic>
+      <p:sp>
+        <p:nvSpPr>
+          <p:cNvPr id="7" name="TextBox 6">
+            <a:extLst>
+              <a:ext uri="{FF2B5EF4-FFF2-40B4-BE49-F238E27FC236}">
+                <a16:creationId xmlns:a16="http://schemas.microsoft.com/office/drawing/2014/main" id="{107179B5-D314-BE2D-231D-F5CCEB0CFB0C}"/>
+              </a:ext>
+            </a:extLst>
+          </p:cNvPr>
+          <p:cNvSpPr txBox="1"/>
+          <p:nvPr/>
+        </p:nvSpPr>
+        <p:spPr>
+          <a:xfrm>
+            <a:off x="9336569" y="4100936"/>
+            <a:ext cx="2582636" cy="307777"/>
           </a:xfrm>
           <a:prstGeom prst="rect">
             <a:avLst/>
@@ -24357,147 +26465,9 @@
           </a:bodyPr>
           <a:lstStyle/>
           <a:p>
-            <a:endParaRPr lang="en-GB" sz="1600" b="1"/>
-          </a:p>
-          <a:p>
-            <a:r>
-              <a:rPr lang="en-GB" sz="1600" b="1"/>
-              <a:t>Domains Addressed:</a:t>
-            </a:r>
-          </a:p>
-          <a:p>
-            <a:pPr marL="342900" indent="-342900">
-              <a:buFont typeface="+mj-lt"/>
-              <a:buAutoNum type="arabicPeriod"/>
-            </a:pPr>
-            <a:r>
-              <a:rPr lang="en-GB" sz="1600" b="1"/>
-              <a:t>Environmental Sustainability: </a:t>
-            </a:r>
-            <a:r>
-              <a:rPr lang="en-GB" sz="1600"/>
-              <a:t>Mitigates e-waste accumulation through responsible disposal practices and recycling initiatives.</a:t>
-            </a:r>
-          </a:p>
-          <a:p>
-            <a:pPr marL="342900" indent="-342900">
-              <a:buFont typeface="+mj-lt"/>
-              <a:buAutoNum type="arabicPeriod"/>
-            </a:pPr>
-            <a:r>
-              <a:rPr lang="en-GB" sz="1600" b="1"/>
-              <a:t>Technology and Innovation</a:t>
-            </a:r>
-            <a:r>
-              <a:rPr lang="en-GB" sz="1600"/>
-              <a:t>: Utilizes cutting-edge technology, such as a user-friendly interface and an interactive chatbot, to revolutionize e-waste management.</a:t>
-            </a:r>
-          </a:p>
-          <a:p>
-            <a:pPr marL="342900" indent="-342900">
-              <a:buFont typeface="+mj-lt"/>
-              <a:buAutoNum type="arabicPeriod"/>
-            </a:pPr>
-            <a:r>
-              <a:rPr lang="en-GB" sz="1600" b="1"/>
-              <a:t>Education and Awareness: </a:t>
-            </a:r>
-            <a:r>
-              <a:rPr lang="en-GB" sz="1600"/>
-              <a:t>Emphasizes user education, raising awareness about the importance of proper e-waste disposal and recycling.</a:t>
-            </a:r>
-          </a:p>
-          <a:p>
-            <a:pPr marL="342900" indent="-342900">
-              <a:buFont typeface="+mj-lt"/>
-              <a:buAutoNum type="arabicPeriod"/>
-            </a:pPr>
-            <a:r>
-              <a:rPr lang="en-GB" sz="1600" b="1"/>
-              <a:t>Business and Industry: </a:t>
-            </a:r>
-            <a:r>
-              <a:rPr lang="en-GB" sz="1600"/>
-              <a:t>Offers a centralized platform for companies to efficiently manage e-waste disposal processes, supporting sustainable production practices.</a:t>
-            </a:r>
-          </a:p>
-          <a:p>
-            <a:endParaRPr lang="en-GB" sz="1600"/>
-          </a:p>
-          <a:p>
-            <a:r>
-              <a:rPr lang="en-GB" sz="1600" b="1"/>
-              <a:t>Impact:</a:t>
-            </a:r>
-          </a:p>
-          <a:p>
-            <a:pPr marL="285750" indent="-285750">
-              <a:buFont typeface="Arial" panose="020B0604020202020204" pitchFamily="34" charset="0"/>
-              <a:buChar char="•"/>
-            </a:pPr>
-            <a:r>
-              <a:rPr lang="en-GB" sz="1600" b="1"/>
-              <a:t>Environmental: </a:t>
-            </a:r>
-            <a:r>
-              <a:rPr lang="en-GB" sz="1600"/>
-              <a:t>Significantly reduces the environmental impact of e-waste accumulation by promoting responsible disposal practices and recycling, contributing to a more sustainable environment.</a:t>
-            </a:r>
-          </a:p>
-          <a:p>
-            <a:pPr marL="285750" indent="-285750">
-              <a:buFont typeface="Arial" panose="020B0604020202020204" pitchFamily="34" charset="0"/>
-              <a:buChar char="•"/>
-            </a:pPr>
-            <a:r>
-              <a:rPr lang="en-GB" sz="1600" b="1"/>
-              <a:t>Economic: </a:t>
-            </a:r>
-            <a:r>
-              <a:rPr lang="en-GB" sz="1600"/>
-              <a:t>Creates a market for recycled electronic components and fosters responsible production practices, potentially stimulating economic growth.</a:t>
-            </a:r>
-          </a:p>
-          <a:p>
-            <a:pPr marL="285750" indent="-285750">
-              <a:buFont typeface="Arial" panose="020B0604020202020204" pitchFamily="34" charset="0"/>
-              <a:buChar char="•"/>
-            </a:pPr>
-            <a:r>
-              <a:rPr lang="en-GB" sz="1600" b="1"/>
-              <a:t>Transparency and Accountability:</a:t>
-            </a:r>
-            <a:r>
-              <a:rPr lang="en-GB" sz="1600"/>
-              <a:t> Encourages e-waste reporting and auditing, promoting transparency and accountability in waste management efforts.</a:t>
-            </a:r>
-          </a:p>
-          <a:p>
-            <a:pPr marL="285750" indent="-285750">
-              <a:buFont typeface="Arial" panose="020B0604020202020204" pitchFamily="34" charset="0"/>
-              <a:buChar char="•"/>
-            </a:pPr>
-            <a:r>
-              <a:rPr lang="en-GB" sz="1600" b="1"/>
-              <a:t>Empowerment</a:t>
-            </a:r>
-            <a:r>
-              <a:rPr lang="en-GB" sz="1600"/>
-              <a:t>: Empowers individuals and businesses to make informed and responsible choices in e-waste disposal, contributing to a cleaner and more sustainable future.</a:t>
-            </a:r>
-          </a:p>
-          <a:p>
-            <a:pPr marL="285750" indent="-285750">
-              <a:buFont typeface="Arial" panose="020B0604020202020204" pitchFamily="34" charset="0"/>
-              <a:buChar char="•"/>
-            </a:pPr>
-            <a:r>
-              <a:rPr lang="en-GB" sz="1600" b="1"/>
-              <a:t>Innovation and Technology Adoption: </a:t>
-            </a:r>
-            <a:r>
-              <a:rPr lang="en-GB" sz="1600"/>
-              <a:t>By leveraging cutting-edge technology, our solution encourages the adoption of innovative waste management practices.</a:t>
+            <a:r>
+              <a:rPr lang="en-IN" sz="1400" b="1"/>
+              <a:t>E-Waste Recycling Platform</a:t>
             </a:r>
           </a:p>
         </p:txBody>
@@ -24505,7 +26475,7 @@
     </p:spTree>
     <p:extLst>
       <p:ext uri="{BB962C8B-B14F-4D97-AF65-F5344CB8AC3E}">
-        <p14:creationId xmlns:p14="http://schemas.microsoft.com/office/powerpoint/2010/main" val="1314302320"/>
+        <p14:creationId xmlns:p14="http://schemas.microsoft.com/office/powerpoint/2010/main" val="1190491742"/>
       </p:ext>
     </p:extLst>
   </p:cSld>
@@ -24548,6 +26518,249 @@
             <p:ph type="title"/>
           </p:nvPr>
         </p:nvSpPr>
+        <p:spPr>
+          <a:xfrm>
+            <a:off x="583719" y="346867"/>
+            <a:ext cx="10982522" cy="387798"/>
+          </a:xfrm>
+        </p:spPr>
+        <p:txBody>
+          <a:bodyPr/>
+          <a:lstStyle/>
+          <a:p>
+            <a:r>
+              <a:rPr lang="en-IN">
+                <a:solidFill>
+                  <a:schemeClr val="accent4">
+                    <a:lumMod val="75000"/>
+                    <a:lumOff val="25000"/>
+                  </a:schemeClr>
+                </a:solidFill>
+              </a:rPr>
+              <a:t>What domains does it address? What is the impact?</a:t>
+            </a:r>
+          </a:p>
+        </p:txBody>
+      </p:sp>
+      <p:sp>
+        <p:nvSpPr>
+          <p:cNvPr id="2" name="TextBox 1">
+            <a:extLst>
+              <a:ext uri="{FF2B5EF4-FFF2-40B4-BE49-F238E27FC236}">
+                <a16:creationId xmlns:a16="http://schemas.microsoft.com/office/drawing/2014/main" id="{81AD24DE-3BF3-6B08-7D70-02D5EFCF97FB}"/>
+              </a:ext>
+            </a:extLst>
+          </p:cNvPr>
+          <p:cNvSpPr txBox="1"/>
+          <p:nvPr/>
+        </p:nvSpPr>
+        <p:spPr>
+          <a:xfrm>
+            <a:off x="360447" y="915446"/>
+            <a:ext cx="11247834" cy="5509200"/>
+          </a:xfrm>
+          <a:prstGeom prst="rect">
+            <a:avLst/>
+          </a:prstGeom>
+          <a:noFill/>
+        </p:spPr>
+        <p:txBody>
+          <a:bodyPr wrap="square" rtlCol="0">
+            <a:spAutoFit/>
+          </a:bodyPr>
+          <a:lstStyle/>
+          <a:p>
+            <a:endParaRPr lang="en-GB" sz="1600" b="1"/>
+          </a:p>
+          <a:p>
+            <a:r>
+              <a:rPr lang="en-GB" sz="1600" b="1"/>
+              <a:t>Domains Addressed:</a:t>
+            </a:r>
+          </a:p>
+          <a:p>
+            <a:pPr marL="342900" indent="-342900">
+              <a:buFont typeface="+mj-lt"/>
+              <a:buAutoNum type="arabicPeriod"/>
+            </a:pPr>
+            <a:r>
+              <a:rPr lang="en-GB" sz="1600" b="1"/>
+              <a:t>Environmental Sustainability: </a:t>
+            </a:r>
+            <a:r>
+              <a:rPr lang="en-GB" sz="1600"/>
+              <a:t>Mitigates e-waste accumulation through responsible disposal practices and recycling initiatives.</a:t>
+            </a:r>
+          </a:p>
+          <a:p>
+            <a:pPr marL="342900" indent="-342900">
+              <a:buFont typeface="+mj-lt"/>
+              <a:buAutoNum type="arabicPeriod"/>
+            </a:pPr>
+            <a:r>
+              <a:rPr lang="en-GB" sz="1600" b="1"/>
+              <a:t>Technology and Innovation</a:t>
+            </a:r>
+            <a:r>
+              <a:rPr lang="en-GB" sz="1600"/>
+              <a:t>: Utilizes cutting-edge technology, such as a user-friendly interface and an interactive chatbot, to revolutionize e-waste management.</a:t>
+            </a:r>
+          </a:p>
+          <a:p>
+            <a:pPr marL="342900" indent="-342900">
+              <a:buFont typeface="+mj-lt"/>
+              <a:buAutoNum type="arabicPeriod"/>
+            </a:pPr>
+            <a:r>
+              <a:rPr lang="en-GB" sz="1600" b="1"/>
+              <a:t>Education and Awareness: </a:t>
+            </a:r>
+            <a:r>
+              <a:rPr lang="en-GB" sz="1600"/>
+              <a:t>Emphasizes user education, raising awareness about the importance of proper e-waste disposal and recycling.</a:t>
+            </a:r>
+          </a:p>
+          <a:p>
+            <a:pPr marL="342900" indent="-342900">
+              <a:buFont typeface="+mj-lt"/>
+              <a:buAutoNum type="arabicPeriod"/>
+            </a:pPr>
+            <a:r>
+              <a:rPr lang="en-GB" sz="1600" b="1"/>
+              <a:t>Business and Industry: </a:t>
+            </a:r>
+            <a:r>
+              <a:rPr lang="en-GB" sz="1600"/>
+              <a:t>Offers a centralized platform for companies to efficiently manage e-waste disposal processes, supporting sustainable production practices.</a:t>
+            </a:r>
+          </a:p>
+          <a:p>
+            <a:endParaRPr lang="en-GB" sz="1600"/>
+          </a:p>
+          <a:p>
+            <a:r>
+              <a:rPr lang="en-GB" sz="1600" b="1"/>
+              <a:t>Impact:</a:t>
+            </a:r>
+          </a:p>
+          <a:p>
+            <a:pPr marL="285750" indent="-285750">
+              <a:buFont typeface="Arial" panose="020B0604020202020204" pitchFamily="34" charset="0"/>
+              <a:buChar char="•"/>
+            </a:pPr>
+            <a:r>
+              <a:rPr lang="en-GB" sz="1600" b="1"/>
+              <a:t>Environmental: </a:t>
+            </a:r>
+            <a:r>
+              <a:rPr lang="en-GB" sz="1600"/>
+              <a:t>Significantly reduces the environmental impact of e-waste accumulation by promoting responsible disposal practices and recycling, contributing to a more sustainable environment.</a:t>
+            </a:r>
+          </a:p>
+          <a:p>
+            <a:pPr marL="285750" indent="-285750">
+              <a:buFont typeface="Arial" panose="020B0604020202020204" pitchFamily="34" charset="0"/>
+              <a:buChar char="•"/>
+            </a:pPr>
+            <a:r>
+              <a:rPr lang="en-GB" sz="1600" b="1"/>
+              <a:t>Economic: </a:t>
+            </a:r>
+            <a:r>
+              <a:rPr lang="en-GB" sz="1600"/>
+              <a:t>Creates a market for recycled electronic components and fosters responsible production practices, potentially stimulating economic growth.</a:t>
+            </a:r>
+          </a:p>
+          <a:p>
+            <a:pPr marL="285750" indent="-285750">
+              <a:buFont typeface="Arial" panose="020B0604020202020204" pitchFamily="34" charset="0"/>
+              <a:buChar char="•"/>
+            </a:pPr>
+            <a:r>
+              <a:rPr lang="en-GB" sz="1600" b="1"/>
+              <a:t>Transparency and Accountability:</a:t>
+            </a:r>
+            <a:r>
+              <a:rPr lang="en-GB" sz="1600"/>
+              <a:t> Encourages e-waste reporting and auditing, promoting transparency and accountability in waste management efforts.</a:t>
+            </a:r>
+          </a:p>
+          <a:p>
+            <a:pPr marL="285750" indent="-285750">
+              <a:buFont typeface="Arial" panose="020B0604020202020204" pitchFamily="34" charset="0"/>
+              <a:buChar char="•"/>
+            </a:pPr>
+            <a:r>
+              <a:rPr lang="en-GB" sz="1600" b="1"/>
+              <a:t>Empowerment</a:t>
+            </a:r>
+            <a:r>
+              <a:rPr lang="en-GB" sz="1600"/>
+              <a:t>: Empowers individuals and businesses to make informed and responsible choices in e-waste disposal, contributing to a cleaner and more sustainable future.</a:t>
+            </a:r>
+          </a:p>
+          <a:p>
+            <a:pPr marL="285750" indent="-285750">
+              <a:buFont typeface="Arial" panose="020B0604020202020204" pitchFamily="34" charset="0"/>
+              <a:buChar char="•"/>
+            </a:pPr>
+            <a:r>
+              <a:rPr lang="en-GB" sz="1600" b="1"/>
+              <a:t>Innovation and Technology Adoption: </a:t>
+            </a:r>
+            <a:r>
+              <a:rPr lang="en-GB" sz="1600"/>
+              <a:t>By leveraging cutting-edge technology, our solution encourages the adoption of innovative waste management practices.</a:t>
+            </a:r>
+          </a:p>
+        </p:txBody>
+      </p:sp>
+    </p:spTree>
+    <p:extLst>
+      <p:ext uri="{BB962C8B-B14F-4D97-AF65-F5344CB8AC3E}">
+        <p14:creationId xmlns:p14="http://schemas.microsoft.com/office/powerpoint/2010/main" val="1314302320"/>
+      </p:ext>
+    </p:extLst>
+  </p:cSld>
+  <p:clrMapOvr>
+    <a:masterClrMapping/>
+  </p:clrMapOvr>
+</p:sld>
+</file>
+
+<file path=ppt/slides/slide7.xml><?xml version="1.0" encoding="utf-8"?>
+<p:sld xmlns:a="http://schemas.openxmlformats.org/drawingml/2006/main" xmlns:r="http://schemas.openxmlformats.org/officeDocument/2006/relationships" xmlns:p="http://schemas.openxmlformats.org/presentationml/2006/main">
+  <p:cSld>
+    <p:spTree>
+      <p:nvGrpSpPr>
+        <p:cNvPr id="1" name=""/>
+        <p:cNvGrpSpPr/>
+        <p:nvPr/>
+      </p:nvGrpSpPr>
+      <p:grpSpPr>
+        <a:xfrm>
+          <a:off x="0" y="0"/>
+          <a:ext cx="0" cy="0"/>
+          <a:chOff x="0" y="0"/>
+          <a:chExt cx="0" cy="0"/>
+        </a:xfrm>
+      </p:grpSpPr>
+      <p:sp>
+        <p:nvSpPr>
+          <p:cNvPr id="4" name="Title 3">
+            <a:extLst>
+              <a:ext uri="{FF2B5EF4-FFF2-40B4-BE49-F238E27FC236}">
+                <a16:creationId xmlns:a16="http://schemas.microsoft.com/office/drawing/2014/main" id="{B46056A9-800D-4D02-A379-968FFCF2FEB7}"/>
+              </a:ext>
+            </a:extLst>
+          </p:cNvPr>
+          <p:cNvSpPr>
+            <a:spLocks noGrp="1"/>
+          </p:cNvSpPr>
+          <p:nvPr>
+            <p:ph type="title"/>
+          </p:nvPr>
+        </p:nvSpPr>
         <p:spPr/>
         <p:txBody>
           <a:bodyPr/>
@@ -24837,7 +27050,7 @@
 </p:sld>
 </file>
 
-<file path=ppt/slides/slide7.xml><?xml version="1.0" encoding="utf-8"?>
+<file path=ppt/slides/slide8.xml><?xml version="1.0" encoding="utf-8"?>
 <p:sld xmlns:a="http://schemas.openxmlformats.org/drawingml/2006/main" xmlns:r="http://schemas.openxmlformats.org/officeDocument/2006/relationships" xmlns:p="http://schemas.openxmlformats.org/presentationml/2006/main">
   <p:cSld>
     <p:spTree>
@@ -25536,240 +27749,6 @@
 </p:sld>
 </file>
 
-<file path=ppt/slides/slide8.xml><?xml version="1.0" encoding="utf-8"?>
-<p:sld xmlns:a="http://schemas.openxmlformats.org/drawingml/2006/main" xmlns:r="http://schemas.openxmlformats.org/officeDocument/2006/relationships" xmlns:p="http://schemas.openxmlformats.org/presentationml/2006/main">
-  <p:cSld>
-    <p:spTree>
-      <p:nvGrpSpPr>
-        <p:cNvPr id="1" name=""/>
-        <p:cNvGrpSpPr/>
-        <p:nvPr/>
-      </p:nvGrpSpPr>
-      <p:grpSpPr>
-        <a:xfrm>
-          <a:off x="0" y="0"/>
-          <a:ext cx="0" cy="0"/>
-          <a:chOff x="0" y="0"/>
-          <a:chExt cx="0" cy="0"/>
-        </a:xfrm>
-      </p:grpSpPr>
-      <p:sp>
-        <p:nvSpPr>
-          <p:cNvPr id="4" name="Title 3">
-            <a:extLst>
-              <a:ext uri="{FF2B5EF4-FFF2-40B4-BE49-F238E27FC236}">
-                <a16:creationId xmlns:a16="http://schemas.microsoft.com/office/drawing/2014/main" id="{B46056A9-800D-4D02-A379-968FFCF2FEB7}"/>
-              </a:ext>
-            </a:extLst>
-          </p:cNvPr>
-          <p:cNvSpPr>
-            <a:spLocks noGrp="1"/>
-          </p:cNvSpPr>
-          <p:nvPr>
-            <p:ph type="title"/>
-          </p:nvPr>
-        </p:nvSpPr>
-        <p:spPr/>
-        <p:txBody>
-          <a:bodyPr/>
-          <a:lstStyle/>
-          <a:p>
-            <a:r>
-              <a:rPr lang="en-IN">
-                <a:solidFill>
-                  <a:schemeClr val="accent4">
-                    <a:lumMod val="75000"/>
-                    <a:lumOff val="25000"/>
-                  </a:schemeClr>
-                </a:solidFill>
-              </a:rPr>
-              <a:t>Technical Feasibility</a:t>
-            </a:r>
-          </a:p>
-        </p:txBody>
-      </p:sp>
-      <p:sp>
-        <p:nvSpPr>
-          <p:cNvPr id="2" name="TextBox 1">
-            <a:extLst>
-              <a:ext uri="{FF2B5EF4-FFF2-40B4-BE49-F238E27FC236}">
-                <a16:creationId xmlns:a16="http://schemas.microsoft.com/office/drawing/2014/main" id="{70F08144-0EBD-11A4-E32E-12273284F55A}"/>
-              </a:ext>
-            </a:extLst>
-          </p:cNvPr>
-          <p:cNvSpPr txBox="1"/>
-          <p:nvPr/>
-        </p:nvSpPr>
-        <p:spPr>
-          <a:xfrm>
-            <a:off x="421821" y="1311529"/>
-            <a:ext cx="11348358" cy="4247317"/>
-          </a:xfrm>
-          <a:prstGeom prst="rect">
-            <a:avLst/>
-          </a:prstGeom>
-          <a:noFill/>
-        </p:spPr>
-        <p:txBody>
-          <a:bodyPr wrap="square" lIns="91440" tIns="45720" rIns="91440" bIns="45720" rtlCol="0" anchor="t">
-            <a:spAutoFit/>
-          </a:bodyPr>
-          <a:lstStyle/>
-          <a:p>
-            <a:pPr marL="285750" indent="-285750">
-              <a:buFont typeface="Arial" panose="020B0604020202020204" pitchFamily="34" charset="0"/>
-              <a:buChar char="•"/>
-            </a:pPr>
-            <a:r>
-              <a:rPr lang="en-GB" b="1" dirty="0">
-                <a:solidFill>
-                  <a:srgbClr val="7030A0"/>
-                </a:solidFill>
-              </a:rPr>
-              <a:t>Advanced Technology Stack: </a:t>
-            </a:r>
-            <a:r>
-              <a:rPr lang="en-GB" dirty="0"/>
-              <a:t>Utilizes React/Next.js, Express.js, and MongoDB, showcasing a robust and modern tech foundation.</a:t>
-            </a:r>
-          </a:p>
-          <a:p>
-            <a:pPr marL="285750" indent="-285750">
-              <a:buFont typeface="Arial" panose="020B0604020202020204" pitchFamily="34" charset="0"/>
-              <a:buChar char="•"/>
-            </a:pPr>
-            <a:endParaRPr lang="en-GB" dirty="0"/>
-          </a:p>
-          <a:p>
-            <a:pPr marL="285750" indent="-285750">
-              <a:buFont typeface="Arial" panose="020B0604020202020204" pitchFamily="34" charset="0"/>
-              <a:buChar char="•"/>
-            </a:pPr>
-            <a:r>
-              <a:rPr lang="en-GB" b="1" dirty="0">
-                <a:solidFill>
-                  <a:srgbClr val="7030A0"/>
-                </a:solidFill>
-              </a:rPr>
-              <a:t>API Integrations:</a:t>
-            </a:r>
-            <a:r>
-              <a:rPr lang="en-GB" dirty="0"/>
-              <a:t> Seamlessly incorporates Google Maps API for precise geolocation of nearby facilities.</a:t>
-            </a:r>
-          </a:p>
-          <a:p>
-            <a:endParaRPr lang="en-GB" dirty="0"/>
-          </a:p>
-          <a:p>
-            <a:pPr marL="285750" indent="-285750">
-              <a:buFont typeface="Arial" panose="020B0604020202020204" pitchFamily="34" charset="0"/>
-              <a:buChar char="•"/>
-            </a:pPr>
-            <a:r>
-              <a:rPr lang="en-GB" b="1" dirty="0">
-                <a:solidFill>
-                  <a:srgbClr val="7030A0"/>
-                </a:solidFill>
-              </a:rPr>
-              <a:t>Blockchain Integration: </a:t>
-            </a:r>
-            <a:r>
-              <a:rPr lang="en-GB" dirty="0"/>
-              <a:t>Ensures transparent tracking of e-waste, emphasizing data integrity and security.</a:t>
-            </a:r>
-          </a:p>
-          <a:p>
-            <a:pPr marL="285750" indent="-285750">
-              <a:buFont typeface="Arial" panose="020B0604020202020204" pitchFamily="34" charset="0"/>
-              <a:buChar char="•"/>
-            </a:pPr>
-            <a:endParaRPr lang="en-GB" dirty="0"/>
-          </a:p>
-          <a:p>
-            <a:pPr marL="285750" indent="-285750">
-              <a:buFont typeface="Arial" panose="020B0604020202020204" pitchFamily="34" charset="0"/>
-              <a:buChar char="•"/>
-            </a:pPr>
-            <a:r>
-              <a:rPr lang="en-GB" b="1" dirty="0">
-                <a:solidFill>
-                  <a:srgbClr val="7030A0"/>
-                </a:solidFill>
-              </a:rPr>
-              <a:t>Real-Time Verification: </a:t>
-            </a:r>
-            <a:r>
-              <a:rPr lang="en-GB" dirty="0"/>
-              <a:t>Capable of verifying facilities in real-time, meeting quality and compliance standards.</a:t>
-            </a:r>
-          </a:p>
-          <a:p>
-            <a:pPr marL="285750" indent="-285750">
-              <a:buFont typeface="Arial" panose="020B0604020202020204" pitchFamily="34" charset="0"/>
-              <a:buChar char="•"/>
-            </a:pPr>
-            <a:endParaRPr lang="en-GB" dirty="0"/>
-          </a:p>
-          <a:p>
-            <a:pPr marL="285750" indent="-285750">
-              <a:buFont typeface="Arial" panose="020B0604020202020204" pitchFamily="34" charset="0"/>
-              <a:buChar char="•"/>
-            </a:pPr>
-            <a:r>
-              <a:rPr lang="en-GB" b="1" dirty="0">
-                <a:solidFill>
-                  <a:srgbClr val="7030A0"/>
-                </a:solidFill>
-              </a:rPr>
-              <a:t>Security Measures:</a:t>
-            </a:r>
-            <a:r>
-              <a:rPr lang="en-GB" dirty="0"/>
-              <a:t> Implements advanced protocols for safeguarding user data, ensuring privacy and integrity.</a:t>
-            </a:r>
-          </a:p>
-          <a:p>
-            <a:pPr marL="285750" indent="-285750">
-              <a:buFont typeface="Arial" panose="020B0604020202020204" pitchFamily="34" charset="0"/>
-              <a:buChar char="•"/>
-            </a:pPr>
-            <a:endParaRPr lang="en-GB" dirty="0"/>
-          </a:p>
-          <a:p>
-            <a:pPr marL="285750" indent="-285750">
-              <a:buFont typeface="Arial" panose="020B0604020202020204" pitchFamily="34" charset="0"/>
-              <a:buChar char="•"/>
-            </a:pPr>
-            <a:r>
-              <a:rPr lang="en-GB" b="1" dirty="0">
-                <a:solidFill>
-                  <a:srgbClr val="7030A0"/>
-                </a:solidFill>
-              </a:rPr>
-              <a:t>Scalability Considerations: </a:t>
-            </a:r>
-            <a:r>
-              <a:rPr lang="en-GB" dirty="0"/>
-              <a:t>While not explicitly mentioned, the technology choices and architecture suggest potential for scalability with appropriate design considerations.</a:t>
-            </a:r>
-            <a:endParaRPr lang="en-IN" dirty="0"/>
-          </a:p>
-        </p:txBody>
-      </p:sp>
-    </p:spTree>
-    <p:extLst>
-      <p:ext uri="{BB962C8B-B14F-4D97-AF65-F5344CB8AC3E}">
-        <p14:creationId xmlns:p14="http://schemas.microsoft.com/office/powerpoint/2010/main" val="1814380580"/>
-      </p:ext>
-    </p:extLst>
-  </p:cSld>
-  <p:clrMapOvr>
-    <a:masterClrMapping/>
-  </p:clrMapOvr>
-</p:sld>
-</file>
-
 <file path=ppt/slides/slide9.xml><?xml version="1.0" encoding="utf-8"?>
 <p:sld xmlns:a="http://schemas.openxmlformats.org/drawingml/2006/main" xmlns:r="http://schemas.openxmlformats.org/officeDocument/2006/relationships" xmlns:p="http://schemas.openxmlformats.org/presentationml/2006/main">
   <p:cSld>
@@ -25817,7 +27796,7 @@
                   </a:schemeClr>
                 </a:solidFill>
               </a:rPr>
-              <a:t>Financial Feasibility</a:t>
+              <a:t>Technical Feasibility</a:t>
             </a:r>
           </a:p>
         </p:txBody>
@@ -25827,7 +27806,7 @@
           <p:cNvPr id="2" name="TextBox 1">
             <a:extLst>
               <a:ext uri="{FF2B5EF4-FFF2-40B4-BE49-F238E27FC236}">
-                <a16:creationId xmlns:a16="http://schemas.microsoft.com/office/drawing/2014/main" id="{CFB429B5-1F1B-D511-B323-51FDACC5DAEA}"/>
+                <a16:creationId xmlns:a16="http://schemas.microsoft.com/office/drawing/2014/main" id="{70F08144-0EBD-11A4-E32E-12273284F55A}"/>
               </a:ext>
             </a:extLst>
           </p:cNvPr>
@@ -25836,8 +27815,8 @@
         </p:nvSpPr>
         <p:spPr>
           <a:xfrm>
-            <a:off x="421821" y="944136"/>
-            <a:ext cx="11348358" cy="5632311"/>
+            <a:off x="421821" y="1311529"/>
+            <a:ext cx="11348358" cy="4247317"/>
           </a:xfrm>
           <a:prstGeom prst="rect">
             <a:avLst/>
@@ -25845,141 +27824,156 @@
           <a:noFill/>
         </p:spPr>
         <p:txBody>
-          <a:bodyPr wrap="square" rtlCol="0">
+          <a:bodyPr wrap="square" lIns="91440" tIns="45720" rIns="91440" bIns="45720" rtlCol="0" anchor="t">
             <a:spAutoFit/>
           </a:bodyPr>
           <a:lstStyle/>
           <a:p>
-            <a:r>
-              <a:rPr lang="en-GB" b="1">
+            <a:pPr marL="285750" indent="-285750">
+              <a:buFont typeface="Arial" panose="020B0604020202020204" pitchFamily="34" charset="0"/>
+              <a:buChar char="•"/>
+            </a:pPr>
+            <a:r>
+              <a:rPr lang="en-GB" b="1" dirty="0">
                 <a:solidFill>
                   <a:srgbClr val="7030A0"/>
                 </a:solidFill>
               </a:rPr>
-              <a:t>1. Cost-Effective Technology Stack: </a:t>
-            </a:r>
-            <a:r>
-              <a:rPr lang="en-GB"/>
-              <a:t>By leveraging open-source technologies and frameworks like React/Next.js and Express.js, we keep development costs low while ensuring high-quality performance.</a:t>
-            </a:r>
-          </a:p>
-          <a:p>
-            <a:endParaRPr lang="en-GB"/>
-          </a:p>
-          <a:p>
-            <a:r>
-              <a:rPr lang="en-GB" b="1">
+              <a:t>Advanced Technology Stack: </a:t>
+            </a:r>
+            <a:r>
+              <a:rPr lang="en-GB" dirty="0"/>
+              <a:t>Utilizes React/Next.js, Express.js, and MongoDB, showcasing a robust and modern tech foundation.</a:t>
+            </a:r>
+          </a:p>
+          <a:p>
+            <a:pPr marL="285750" indent="-285750">
+              <a:buFont typeface="Arial" panose="020B0604020202020204" pitchFamily="34" charset="0"/>
+              <a:buChar char="•"/>
+            </a:pPr>
+            <a:endParaRPr lang="en-GB" dirty="0"/>
+          </a:p>
+          <a:p>
+            <a:pPr marL="285750" indent="-285750">
+              <a:buFont typeface="Arial" panose="020B0604020202020204" pitchFamily="34" charset="0"/>
+              <a:buChar char="•"/>
+            </a:pPr>
+            <a:r>
+              <a:rPr lang="en-GB" b="1" dirty="0">
                 <a:solidFill>
                   <a:srgbClr val="7030A0"/>
                 </a:solidFill>
               </a:rPr>
-              <a:t>2. Scalable Architecture: </a:t>
-            </a:r>
-            <a:r>
-              <a:rPr lang="en-GB"/>
-              <a:t>The platform's design allows for seamless scaling, minimizing additional infrastructure costs as user base grows.</a:t>
-            </a:r>
-          </a:p>
-          <a:p>
-            <a:endParaRPr lang="en-GB"/>
-          </a:p>
-          <a:p>
-            <a:r>
-              <a:rPr lang="en-GB" b="1">
+              <a:t>API Integrations:</a:t>
+            </a:r>
+            <a:r>
+              <a:rPr lang="en-GB" dirty="0"/>
+              <a:t> Seamlessly incorporates Google Maps API for precise geolocation of nearby facilities.</a:t>
+            </a:r>
+          </a:p>
+          <a:p>
+            <a:endParaRPr lang="en-GB" dirty="0"/>
+          </a:p>
+          <a:p>
+            <a:pPr marL="285750" indent="-285750">
+              <a:buFont typeface="Arial" panose="020B0604020202020204" pitchFamily="34" charset="0"/>
+              <a:buChar char="•"/>
+            </a:pPr>
+            <a:r>
+              <a:rPr lang="en-GB" b="1" dirty="0">
                 <a:solidFill>
                   <a:srgbClr val="7030A0"/>
                 </a:solidFill>
               </a:rPr>
-              <a:t>3. Potential Revenue Streams</a:t>
-            </a:r>
-            <a:r>
-              <a:rPr lang="en-GB">
+              <a:t>Blockchain Integration: </a:t>
+            </a:r>
+            <a:r>
+              <a:rPr lang="en-GB" dirty="0"/>
+              <a:t>Ensures transparent tracking of e-waste, emphasizing data integrity and security.</a:t>
+            </a:r>
+          </a:p>
+          <a:p>
+            <a:pPr marL="285750" indent="-285750">
+              <a:buFont typeface="Arial" panose="020B0604020202020204" pitchFamily="34" charset="0"/>
+              <a:buChar char="•"/>
+            </a:pPr>
+            <a:endParaRPr lang="en-GB" dirty="0"/>
+          </a:p>
+          <a:p>
+            <a:pPr marL="285750" indent="-285750">
+              <a:buFont typeface="Arial" panose="020B0604020202020204" pitchFamily="34" charset="0"/>
+              <a:buChar char="•"/>
+            </a:pPr>
+            <a:r>
+              <a:rPr lang="en-GB" b="1" dirty="0">
                 <a:solidFill>
                   <a:srgbClr val="7030A0"/>
                 </a:solidFill>
               </a:rPr>
-              <a:t>: </a:t>
-            </a:r>
-            <a:r>
-              <a:rPr lang="en-GB"/>
-              <a:t>Opportunities for revenue generation include premium features, strategic partnerships with e-waste facilities, and potential subscription models for advanced services.</a:t>
-            </a:r>
-          </a:p>
-          <a:p>
-            <a:endParaRPr lang="en-GB"/>
-          </a:p>
-          <a:p>
-            <a:r>
-              <a:rPr lang="en-GB" b="1">
+              <a:t>Real-Time Verification: </a:t>
+            </a:r>
+            <a:r>
+              <a:rPr lang="en-GB" dirty="0"/>
+              <a:t>Capable of verifying facilities in real-time, meeting quality and compliance standards.</a:t>
+            </a:r>
+          </a:p>
+          <a:p>
+            <a:pPr marL="285750" indent="-285750">
+              <a:buFont typeface="Arial" panose="020B0604020202020204" pitchFamily="34" charset="0"/>
+              <a:buChar char="•"/>
+            </a:pPr>
+            <a:endParaRPr lang="en-GB" dirty="0"/>
+          </a:p>
+          <a:p>
+            <a:pPr marL="285750" indent="-285750">
+              <a:buFont typeface="Arial" panose="020B0604020202020204" pitchFamily="34" charset="0"/>
+              <a:buChar char="•"/>
+            </a:pPr>
+            <a:r>
+              <a:rPr lang="en-GB" b="1" dirty="0">
                 <a:solidFill>
                   <a:srgbClr val="7030A0"/>
                 </a:solidFill>
               </a:rPr>
-              <a:t>4. Grant and Funding Opportunities: </a:t>
-            </a:r>
-            <a:r>
-              <a:rPr lang="en-GB"/>
-              <a:t>Explore grants and funding programs aimed at supporting sustainable and innovative solutions in the e-waste management sector.</a:t>
-            </a:r>
-          </a:p>
-          <a:p>
-            <a:endParaRPr lang="en-GB"/>
-          </a:p>
-          <a:p>
-            <a:r>
-              <a:rPr lang="en-GB" b="1">
+              <a:t>Security Measures:</a:t>
+            </a:r>
+            <a:r>
+              <a:rPr lang="en-GB" dirty="0"/>
+              <a:t> Implements advanced protocols for safeguarding user data, ensuring privacy and integrity.</a:t>
+            </a:r>
+          </a:p>
+          <a:p>
+            <a:pPr marL="285750" indent="-285750">
+              <a:buFont typeface="Arial" panose="020B0604020202020204" pitchFamily="34" charset="0"/>
+              <a:buChar char="•"/>
+            </a:pPr>
+            <a:endParaRPr lang="en-GB" dirty="0"/>
+          </a:p>
+          <a:p>
+            <a:pPr marL="285750" indent="-285750">
+              <a:buFont typeface="Arial" panose="020B0604020202020204" pitchFamily="34" charset="0"/>
+              <a:buChar char="•"/>
+            </a:pPr>
+            <a:r>
+              <a:rPr lang="en-GB" b="1" dirty="0">
                 <a:solidFill>
                   <a:srgbClr val="7030A0"/>
                 </a:solidFill>
               </a:rPr>
-              <a:t>5. Economic Impact: </a:t>
-            </a:r>
-            <a:r>
-              <a:rPr lang="en-GB"/>
-              <a:t>By stimulating a market for recycled electronic components, the platform has the potential to contribute to economic growth in the e-waste recycling industry.</a:t>
-            </a:r>
-          </a:p>
-          <a:p>
-            <a:endParaRPr lang="en-GB"/>
-          </a:p>
-          <a:p>
-            <a:r>
-              <a:rPr lang="en-GB" b="1">
-                <a:solidFill>
-                  <a:srgbClr val="7030A0"/>
-                </a:solidFill>
-              </a:rPr>
-              <a:t>6. Operational Efficiency:</a:t>
-            </a:r>
-            <a:r>
-              <a:rPr lang="en-GB"/>
-              <a:t> Streamlined processes, including real-time verification and AI-powered assessments, optimize resource utilization and contribute to cost efficiency.</a:t>
-            </a:r>
-          </a:p>
-          <a:p>
-            <a:endParaRPr lang="en-GB"/>
-          </a:p>
-          <a:p>
-            <a:r>
-              <a:rPr lang="en-GB" b="1">
-                <a:solidFill>
-                  <a:srgbClr val="7030A0"/>
-                </a:solidFill>
-              </a:rPr>
-              <a:t>7. ROI for Facility Owners: </a:t>
-            </a:r>
-            <a:r>
-              <a:rPr lang="en-GB"/>
-              <a:t>Facility owners can benefit from increased business through the platform, potentially leading to a positive return on investment in their e-waste disposal operations.</a:t>
-            </a:r>
-            <a:endParaRPr lang="en-IN"/>
+              <a:t>Scalability Considerations: </a:t>
+            </a:r>
+            <a:r>
+              <a:rPr lang="en-GB" dirty="0"/>
+              <a:t>While not explicitly mentioned, the technology choices and architecture suggest potential for scalability with appropriate design considerations.</a:t>
+            </a:r>
+            <a:endParaRPr lang="en-IN" dirty="0"/>
           </a:p>
         </p:txBody>
       </p:sp>
     </p:spTree>
     <p:extLst>
       <p:ext uri="{BB962C8B-B14F-4D97-AF65-F5344CB8AC3E}">
-        <p14:creationId xmlns:p14="http://schemas.microsoft.com/office/powerpoint/2010/main" val="2349704376"/>
+        <p14:creationId xmlns:p14="http://schemas.microsoft.com/office/powerpoint/2010/main" val="1814380580"/>
       </p:ext>
     </p:extLst>
   </p:cSld>
@@ -26747,15 +28741,6 @@
 </file>
 
 <file path=customXml/item1.xml><?xml version="1.0" encoding="utf-8"?>
-<?mso-contentType ?>
-<FormTemplates xmlns="http://schemas.microsoft.com/sharepoint/v3/contenttype/forms">
-  <Display>DocumentLibraryForm</Display>
-  <Edit>DocumentLibraryForm</Edit>
-  <New>DocumentLibraryForm</New>
-</FormTemplates>
-</file>
-
-<file path=customXml/item2.xml><?xml version="1.0" encoding="utf-8"?>
 <ct:contentTypeSchema xmlns:ct="http://schemas.microsoft.com/office/2006/metadata/contentType" xmlns:ma="http://schemas.microsoft.com/office/2006/metadata/properties/metaAttributes" ct:_="" ma:_="" ma:contentTypeName="Document" ma:contentTypeID="0x010100C5F307115173874D9935440D6D41F0A3" ma:contentTypeVersion="17" ma:contentTypeDescription="Create a new document." ma:contentTypeScope="" ma:versionID="5451c25ad900bb2f5e99577579c52b91">
   <xsd:schema xmlns:xsd="http://www.w3.org/2001/XMLSchema" xmlns:xs="http://www.w3.org/2001/XMLSchema" xmlns:p="http://schemas.microsoft.com/office/2006/metadata/properties" xmlns:ns3="5c29ac05-baf2-4e5f-a494-f230e5d9abdd" xmlns:ns4="ce0aa6ee-8978-4e1d-890a-1a23e6b8b905" targetNamespace="http://schemas.microsoft.com/office/2006/metadata/properties" ma:root="true" ma:fieldsID="cb3f978be5a13820aff08d2ac7e64c9c" ns3:_="" ns4:_="">
     <xsd:import namespace="5c29ac05-baf2-4e5f-a494-f230e5d9abdd"/>
@@ -27002,6 +28987,15 @@
 </ct:contentTypeSchema>
 </file>
 
+<file path=customXml/item2.xml><?xml version="1.0" encoding="utf-8"?>
+<?mso-contentType ?>
+<FormTemplates xmlns="http://schemas.microsoft.com/sharepoint/v3/contenttype/forms">
+  <Display>DocumentLibraryForm</Display>
+  <Edit>DocumentLibraryForm</Edit>
+  <New>DocumentLibraryForm</New>
+</FormTemplates>
+</file>
+
 <file path=customXml/item3.xml><?xml version="1.0" encoding="utf-8"?>
 <p:properties xmlns:p="http://schemas.microsoft.com/office/2006/metadata/properties" xmlns:xsi="http://www.w3.org/2001/XMLSchema-instance" xmlns:pc="http://schemas.microsoft.com/office/infopath/2007/PartnerControls">
   <documentManagement>
@@ -27011,14 +29005,6 @@
 </file>
 
 <file path=customXml/itemProps1.xml><?xml version="1.0" encoding="utf-8"?>
-<ds:datastoreItem xmlns:ds="http://schemas.openxmlformats.org/officeDocument/2006/customXml" ds:itemID="{7D301BF1-8071-4217-89C4-9BC7CB0D2F40}">
-  <ds:schemaRefs>
-    <ds:schemaRef ds:uri="http://schemas.microsoft.com/sharepoint/v3/contenttype/forms"/>
-  </ds:schemaRefs>
-</ds:datastoreItem>
-</file>
-
-<file path=customXml/itemProps2.xml><?xml version="1.0" encoding="utf-8"?>
 <ds:datastoreItem xmlns:ds="http://schemas.openxmlformats.org/officeDocument/2006/customXml" ds:itemID="{D52764EA-CFFB-44FF-BE6C-715C17650FB9}">
   <ds:schemaRefs>
     <ds:schemaRef ds:uri="5c29ac05-baf2-4e5f-a494-f230e5d9abdd"/>
@@ -27034,6 +29020,14 @@
     <ds:schemaRef ds:uri="http://schemas.openxmlformats.org/package/2006/metadata/core-properties"/>
     <ds:schemaRef ds:uri="http://www.w3.org/2000/xmlns/"/>
     <ds:schemaRef ds:uri="http://www.w3.org/2001/XMLSchema"/>
+  </ds:schemaRefs>
+</ds:datastoreItem>
+</file>
+
+<file path=customXml/itemProps2.xml><?xml version="1.0" encoding="utf-8"?>
+<ds:datastoreItem xmlns:ds="http://schemas.openxmlformats.org/officeDocument/2006/customXml" ds:itemID="{7D301BF1-8071-4217-89C4-9BC7CB0D2F40}">
+  <ds:schemaRefs>
+    <ds:schemaRef ds:uri="http://schemas.microsoft.com/sharepoint/v3/contenttype/forms"/>
   </ds:schemaRefs>
 </ds:datastoreItem>
 </file>

</xml_diff>

<commit_message>
Refactor layout spacing, update TypeScript types, and enhance .gitignore for better project management
</commit_message>
<xml_diff>
--- a/I-nnovate_Hackathon Spam Byte Submission.pptx
+++ b/I-nnovate_Hackathon Spam Byte Submission.pptx
@@ -236,7 +236,7 @@
           <a:p>
             <a:fld id="{9A69CF9B-9788-489B-AA5F-D369B980CDA3}" type="datetimeFigureOut">
               <a:rPr lang="en-IN" smtClean="0"/>
-              <a:t>05-12-2023</a:t>
+              <a:t>02-04-2024</a:t>
             </a:fld>
             <a:endParaRPr lang="en-IN"/>
           </a:p>
@@ -401,7 +401,7 @@
           <a:p>
             <a:fld id="{FFCDD790-8BB2-467C-818E-2F302AAFF003}" type="datetimeFigureOut">
               <a:rPr lang="en-IN" smtClean="0"/>
-              <a:t>05-12-2023</a:t>
+              <a:t>02-04-2024</a:t>
             </a:fld>
             <a:endParaRPr lang="en-IN"/>
           </a:p>
@@ -27305,56 +27305,12 @@
         </p:nvGrpSpPr>
         <p:grpSpPr>
           <a:xfrm>
-            <a:off x="7922062" y="1490030"/>
-            <a:ext cx="3762366" cy="4270068"/>
-            <a:chOff x="7211662" y="587885"/>
-            <a:chExt cx="4588329" cy="5086350"/>
+            <a:off x="8263011" y="1602720"/>
+            <a:ext cx="3092906" cy="2677452"/>
+            <a:chOff x="7619876" y="747075"/>
+            <a:chExt cx="3771901" cy="3189284"/>
           </a:xfrm>
         </p:grpSpPr>
-        <p:sp>
-          <p:nvSpPr>
-            <p:cNvPr id="16" name="Rectangle 15">
-              <a:extLst>
-                <a:ext uri="{FF2B5EF4-FFF2-40B4-BE49-F238E27FC236}">
-                  <a16:creationId xmlns:a16="http://schemas.microsoft.com/office/drawing/2014/main" id="{C4A63F48-925D-3C76-12C9-0374FE8A28DB}"/>
-                </a:ext>
-              </a:extLst>
-            </p:cNvPr>
-            <p:cNvSpPr/>
-            <p:nvPr/>
-          </p:nvSpPr>
-          <p:spPr>
-            <a:xfrm>
-              <a:off x="7211662" y="587885"/>
-              <a:ext cx="4588329" cy="5086350"/>
-            </a:xfrm>
-            <a:prstGeom prst="rect">
-              <a:avLst/>
-            </a:prstGeom>
-          </p:spPr>
-          <p:style>
-            <a:lnRef idx="2">
-              <a:schemeClr val="accent6"/>
-            </a:lnRef>
-            <a:fillRef idx="1">
-              <a:schemeClr val="lt1"/>
-            </a:fillRef>
-            <a:effectRef idx="0">
-              <a:schemeClr val="accent6"/>
-            </a:effectRef>
-            <a:fontRef idx="minor">
-              <a:schemeClr val="dk1"/>
-            </a:fontRef>
-          </p:style>
-          <p:txBody>
-            <a:bodyPr rtlCol="0" anchor="ctr"/>
-            <a:lstStyle/>
-            <a:p>
-              <a:pPr algn="ctr"/>
-              <a:endParaRPr lang="en-IN"/>
-            </a:p>
-          </p:txBody>
-        </p:sp>
         <p:pic>
           <p:nvPicPr>
             <p:cNvPr id="5" name="Picture 6">
@@ -28988,20 +28944,20 @@
 </file>
 
 <file path=customXml/item2.xml><?xml version="1.0" encoding="utf-8"?>
+<p:properties xmlns:p="http://schemas.microsoft.com/office/2006/metadata/properties" xmlns:xsi="http://www.w3.org/2001/XMLSchema-instance" xmlns:pc="http://schemas.microsoft.com/office/infopath/2007/PartnerControls">
+  <documentManagement>
+    <_activity xmlns="ce0aa6ee-8978-4e1d-890a-1a23e6b8b905" xsi:nil="true"/>
+  </documentManagement>
+</p:properties>
+</file>
+
+<file path=customXml/item3.xml><?xml version="1.0" encoding="utf-8"?>
 <?mso-contentType ?>
 <FormTemplates xmlns="http://schemas.microsoft.com/sharepoint/v3/contenttype/forms">
   <Display>DocumentLibraryForm</Display>
   <Edit>DocumentLibraryForm</Edit>
   <New>DocumentLibraryForm</New>
 </FormTemplates>
-</file>
-
-<file path=customXml/item3.xml><?xml version="1.0" encoding="utf-8"?>
-<p:properties xmlns:p="http://schemas.microsoft.com/office/2006/metadata/properties" xmlns:xsi="http://www.w3.org/2001/XMLSchema-instance" xmlns:pc="http://schemas.microsoft.com/office/infopath/2007/PartnerControls">
-  <documentManagement>
-    <_activity xmlns="ce0aa6ee-8978-4e1d-890a-1a23e6b8b905" xsi:nil="true"/>
-  </documentManagement>
-</p:properties>
 </file>
 
 <file path=customXml/itemProps1.xml><?xml version="1.0" encoding="utf-8"?>
@@ -29025,14 +28981,6 @@
 </file>
 
 <file path=customXml/itemProps2.xml><?xml version="1.0" encoding="utf-8"?>
-<ds:datastoreItem xmlns:ds="http://schemas.openxmlformats.org/officeDocument/2006/customXml" ds:itemID="{7D301BF1-8071-4217-89C4-9BC7CB0D2F40}">
-  <ds:schemaRefs>
-    <ds:schemaRef ds:uri="http://schemas.microsoft.com/sharepoint/v3/contenttype/forms"/>
-  </ds:schemaRefs>
-</ds:datastoreItem>
-</file>
-
-<file path=customXml/itemProps3.xml><?xml version="1.0" encoding="utf-8"?>
 <ds:datastoreItem xmlns:ds="http://schemas.openxmlformats.org/officeDocument/2006/customXml" ds:itemID="{0D4C13C1-48DD-428E-844C-C2764C6404A0}">
   <ds:schemaRefs>
     <ds:schemaRef ds:uri="http://schemas.microsoft.com/office/2006/documentManagement/types"/>
@@ -29047,4 +28995,12 @@
     <ds:schemaRef ds:uri="http://purl.org/dc/terms/"/>
   </ds:schemaRefs>
 </ds:datastoreItem>
+</file>
+
+<file path=customXml/itemProps3.xml><?xml version="1.0" encoding="utf-8"?>
+<ds:datastoreItem xmlns:ds="http://schemas.openxmlformats.org/officeDocument/2006/customXml" ds:itemID="{7D301BF1-8071-4217-89C4-9BC7CB0D2F40}">
+  <ds:schemaRefs>
+    <ds:schemaRef ds:uri="http://schemas.microsoft.com/sharepoint/v3/contenttype/forms"/>
+  </ds:schemaRefs>
+</ds:datastoreItem>
 </file>
</xml_diff>